<commit_message>
Try with square loss
</commit_message>
<xml_diff>
--- a/material/trains_technical.pptx
+++ b/material/trains_technical.pptx
@@ -5,23 +5,24 @@
     <p:sldMasterId id="2147483660" r:id="rId1"/>
   </p:sldMasterIdLst>
   <p:notesMasterIdLst>
-    <p:notesMasterId r:id="rId16"/>
+    <p:notesMasterId r:id="rId17"/>
   </p:notesMasterIdLst>
   <p:sldIdLst>
     <p:sldId id="283" r:id="rId2"/>
     <p:sldId id="258" r:id="rId3"/>
     <p:sldId id="288" r:id="rId4"/>
-    <p:sldId id="290" r:id="rId5"/>
-    <p:sldId id="291" r:id="rId6"/>
-    <p:sldId id="292" r:id="rId7"/>
-    <p:sldId id="293" r:id="rId8"/>
-    <p:sldId id="294" r:id="rId9"/>
-    <p:sldId id="300" r:id="rId10"/>
-    <p:sldId id="298" r:id="rId11"/>
-    <p:sldId id="299" r:id="rId12"/>
-    <p:sldId id="297" r:id="rId13"/>
-    <p:sldId id="289" r:id="rId14"/>
-    <p:sldId id="296" r:id="rId15"/>
+    <p:sldId id="302" r:id="rId5"/>
+    <p:sldId id="290" r:id="rId6"/>
+    <p:sldId id="291" r:id="rId7"/>
+    <p:sldId id="292" r:id="rId8"/>
+    <p:sldId id="293" r:id="rId9"/>
+    <p:sldId id="294" r:id="rId10"/>
+    <p:sldId id="300" r:id="rId11"/>
+    <p:sldId id="298" r:id="rId12"/>
+    <p:sldId id="299" r:id="rId13"/>
+    <p:sldId id="297" r:id="rId14"/>
+    <p:sldId id="289" r:id="rId15"/>
+    <p:sldId id="296" r:id="rId16"/>
   </p:sldIdLst>
   <p:sldSz cx="9899650" cy="6858000"/>
   <p:notesSz cx="6810375" cy="9942513"/>
@@ -659,7 +660,7 @@
     </p:spTree>
     <p:extLst>
       <p:ext uri="{BB962C8B-B14F-4D97-AF65-F5344CB8AC3E}">
-        <p14:creationId xmlns:p14="http://schemas.microsoft.com/office/powerpoint/2010/main" val="3566251874"/>
+        <p14:creationId xmlns:p14="http://schemas.microsoft.com/office/powerpoint/2010/main" val="947189533"/>
       </p:ext>
     </p:extLst>
   </p:cSld>
@@ -743,7 +744,7 @@
     </p:spTree>
     <p:extLst>
       <p:ext uri="{BB962C8B-B14F-4D97-AF65-F5344CB8AC3E}">
-        <p14:creationId xmlns:p14="http://schemas.microsoft.com/office/powerpoint/2010/main" val="1253510899"/>
+        <p14:creationId xmlns:p14="http://schemas.microsoft.com/office/powerpoint/2010/main" val="3566251874"/>
       </p:ext>
     </p:extLst>
   </p:cSld>
@@ -827,7 +828,7 @@
     </p:spTree>
     <p:extLst>
       <p:ext uri="{BB962C8B-B14F-4D97-AF65-F5344CB8AC3E}">
-        <p14:creationId xmlns:p14="http://schemas.microsoft.com/office/powerpoint/2010/main" val="4102638566"/>
+        <p14:creationId xmlns:p14="http://schemas.microsoft.com/office/powerpoint/2010/main" val="1253510899"/>
       </p:ext>
     </p:extLst>
   </p:cSld>
@@ -903,6 +904,90 @@
             <a:fld id="{5EFDCE45-14EF-C643-A106-E8B98409B9C5}" type="slidenum">
               <a:rPr lang="en-US" smtClean="0"/>
               <a:t>14</a:t>
+            </a:fld>
+            <a:endParaRPr lang="en-US"/>
+          </a:p>
+        </p:txBody>
+      </p:sp>
+    </p:spTree>
+    <p:extLst>
+      <p:ext uri="{BB962C8B-B14F-4D97-AF65-F5344CB8AC3E}">
+        <p14:creationId xmlns:p14="http://schemas.microsoft.com/office/powerpoint/2010/main" val="4102638566"/>
+      </p:ext>
+    </p:extLst>
+  </p:cSld>
+  <p:clrMapOvr>
+    <a:masterClrMapping/>
+  </p:clrMapOvr>
+</p:notes>
+</file>
+
+<file path=ppt/notesSlides/notesSlide14.xml><?xml version="1.0" encoding="utf-8"?>
+<p:notes xmlns:a="http://schemas.openxmlformats.org/drawingml/2006/main" xmlns:r="http://schemas.openxmlformats.org/officeDocument/2006/relationships" xmlns:p="http://schemas.openxmlformats.org/presentationml/2006/main">
+  <p:cSld>
+    <p:spTree>
+      <p:nvGrpSpPr>
+        <p:cNvPr id="1" name=""/>
+        <p:cNvGrpSpPr/>
+        <p:nvPr/>
+      </p:nvGrpSpPr>
+      <p:grpSpPr>
+        <a:xfrm>
+          <a:off x="0" y="0"/>
+          <a:ext cx="0" cy="0"/>
+          <a:chOff x="0" y="0"/>
+          <a:chExt cx="0" cy="0"/>
+        </a:xfrm>
+      </p:grpSpPr>
+      <p:sp>
+        <p:nvSpPr>
+          <p:cNvPr id="2" name="Slide Image Placeholder 1"/>
+          <p:cNvSpPr>
+            <a:spLocks noGrp="1" noRot="1" noChangeAspect="1"/>
+          </p:cNvSpPr>
+          <p:nvPr>
+            <p:ph type="sldImg"/>
+          </p:nvPr>
+        </p:nvSpPr>
+        <p:spPr/>
+      </p:sp>
+      <p:sp>
+        <p:nvSpPr>
+          <p:cNvPr id="3" name="Notes Placeholder 2"/>
+          <p:cNvSpPr>
+            <a:spLocks noGrp="1"/>
+          </p:cNvSpPr>
+          <p:nvPr>
+            <p:ph type="body" idx="1"/>
+          </p:nvPr>
+        </p:nvSpPr>
+        <p:spPr/>
+        <p:txBody>
+          <a:bodyPr/>
+          <a:lstStyle/>
+          <a:p>
+            <a:endParaRPr lang="en-US"/>
+          </a:p>
+        </p:txBody>
+      </p:sp>
+      <p:sp>
+        <p:nvSpPr>
+          <p:cNvPr id="4" name="Slide Number Placeholder 3"/>
+          <p:cNvSpPr>
+            <a:spLocks noGrp="1"/>
+          </p:cNvSpPr>
+          <p:nvPr>
+            <p:ph type="sldNum" sz="quarter" idx="10"/>
+          </p:nvPr>
+        </p:nvSpPr>
+        <p:spPr/>
+        <p:txBody>
+          <a:bodyPr/>
+          <a:lstStyle/>
+          <a:p>
+            <a:fld id="{5EFDCE45-14EF-C643-A106-E8B98409B9C5}" type="slidenum">
+              <a:rPr lang="en-US" smtClean="0"/>
+              <a:t>15</a:t>
             </a:fld>
             <a:endParaRPr lang="en-US"/>
           </a:p>
@@ -1079,7 +1164,7 @@
     </p:spTree>
     <p:extLst>
       <p:ext uri="{BB962C8B-B14F-4D97-AF65-F5344CB8AC3E}">
-        <p14:creationId xmlns:p14="http://schemas.microsoft.com/office/powerpoint/2010/main" val="4102990982"/>
+        <p14:creationId xmlns:p14="http://schemas.microsoft.com/office/powerpoint/2010/main" val="789750115"/>
       </p:ext>
     </p:extLst>
   </p:cSld>
@@ -1163,7 +1248,7 @@
     </p:spTree>
     <p:extLst>
       <p:ext uri="{BB962C8B-B14F-4D97-AF65-F5344CB8AC3E}">
-        <p14:creationId xmlns:p14="http://schemas.microsoft.com/office/powerpoint/2010/main" val="204301251"/>
+        <p14:creationId xmlns:p14="http://schemas.microsoft.com/office/powerpoint/2010/main" val="4102990982"/>
       </p:ext>
     </p:extLst>
   </p:cSld>
@@ -1247,7 +1332,7 @@
     </p:spTree>
     <p:extLst>
       <p:ext uri="{BB962C8B-B14F-4D97-AF65-F5344CB8AC3E}">
-        <p14:creationId xmlns:p14="http://schemas.microsoft.com/office/powerpoint/2010/main" val="81338786"/>
+        <p14:creationId xmlns:p14="http://schemas.microsoft.com/office/powerpoint/2010/main" val="204301251"/>
       </p:ext>
     </p:extLst>
   </p:cSld>
@@ -1331,7 +1416,7 @@
     </p:spTree>
     <p:extLst>
       <p:ext uri="{BB962C8B-B14F-4D97-AF65-F5344CB8AC3E}">
-        <p14:creationId xmlns:p14="http://schemas.microsoft.com/office/powerpoint/2010/main" val="2313599379"/>
+        <p14:creationId xmlns:p14="http://schemas.microsoft.com/office/powerpoint/2010/main" val="81338786"/>
       </p:ext>
     </p:extLst>
   </p:cSld>
@@ -1415,7 +1500,7 @@
     </p:spTree>
     <p:extLst>
       <p:ext uri="{BB962C8B-B14F-4D97-AF65-F5344CB8AC3E}">
-        <p14:creationId xmlns:p14="http://schemas.microsoft.com/office/powerpoint/2010/main" val="4152047762"/>
+        <p14:creationId xmlns:p14="http://schemas.microsoft.com/office/powerpoint/2010/main" val="2313599379"/>
       </p:ext>
     </p:extLst>
   </p:cSld>
@@ -1499,7 +1584,7 @@
     </p:spTree>
     <p:extLst>
       <p:ext uri="{BB962C8B-B14F-4D97-AF65-F5344CB8AC3E}">
-        <p14:creationId xmlns:p14="http://schemas.microsoft.com/office/powerpoint/2010/main" val="2416047021"/>
+        <p14:creationId xmlns:p14="http://schemas.microsoft.com/office/powerpoint/2010/main" val="4152047762"/>
       </p:ext>
     </p:extLst>
   </p:cSld>
@@ -1583,7 +1668,7 @@
     </p:spTree>
     <p:extLst>
       <p:ext uri="{BB962C8B-B14F-4D97-AF65-F5344CB8AC3E}">
-        <p14:creationId xmlns:p14="http://schemas.microsoft.com/office/powerpoint/2010/main" val="947189533"/>
+        <p14:creationId xmlns:p14="http://schemas.microsoft.com/office/powerpoint/2010/main" val="2416047021"/>
       </p:ext>
     </p:extLst>
   </p:cSld>
@@ -9630,7 +9715,7 @@
                 <a:ea typeface="Avenir Black" charset="0"/>
                 <a:cs typeface="Avenir Black" charset="0"/>
               </a:rPr>
-              <a:t>Data pre-processing</a:t>
+              <a:t>Feature Data</a:t>
             </a:r>
           </a:p>
         </p:txBody>
@@ -9663,7 +9748,7 @@
               </a:lnSpc>
             </a:pPr>
             <a:r>
-              <a:rPr lang="fi-FI" dirty="0" err="1">
+              <a:rPr lang="en-US" dirty="0">
                 <a:solidFill>
                   <a:schemeClr val="bg2">
                     <a:lumMod val="50000"/>
@@ -9673,10 +9758,17 @@
                 <a:ea typeface="Avenir Book" charset="0"/>
                 <a:cs typeface="Avenir Book" charset="0"/>
               </a:rPr>
-              <a:t>Weather</a:t>
-            </a:r>
-            <a:r>
-              <a:rPr lang="fi-FI" dirty="0">
+              <a:t>Features for training: </a:t>
+            </a:r>
+          </a:p>
+          <a:p>
+            <a:pPr marL="883800" lvl="1" indent="-198000">
+              <a:lnSpc>
+                <a:spcPct val="130000"/>
+              </a:lnSpc>
+            </a:pPr>
+            <a:r>
+              <a:rPr lang="en-US" dirty="0">
                 <a:solidFill>
                   <a:schemeClr val="bg2">
                     <a:lumMod val="50000"/>
@@ -9686,343 +9778,8 @@
                 <a:ea typeface="Avenir Book" charset="0"/>
                 <a:cs typeface="Avenir Book" charset="0"/>
               </a:rPr>
-              <a:t> </a:t>
-            </a:r>
-            <a:r>
-              <a:rPr lang="fi-FI" dirty="0" err="1">
-                <a:solidFill>
-                  <a:schemeClr val="bg2">
-                    <a:lumMod val="50000"/>
-                  </a:schemeClr>
-                </a:solidFill>
-                <a:latin typeface="Avenir Book" charset="0"/>
-                <a:ea typeface="Avenir Book" charset="0"/>
-                <a:cs typeface="Avenir Book" charset="0"/>
-              </a:rPr>
-              <a:t>observation</a:t>
-            </a:r>
-            <a:r>
-              <a:rPr lang="fi-FI" dirty="0">
-                <a:solidFill>
-                  <a:schemeClr val="bg2">
-                    <a:lumMod val="50000"/>
-                  </a:schemeClr>
-                </a:solidFill>
-                <a:latin typeface="Avenir Book" charset="0"/>
-                <a:ea typeface="Avenir Book" charset="0"/>
-                <a:cs typeface="Avenir Book" charset="0"/>
-              </a:rPr>
-              <a:t> </a:t>
-            </a:r>
-            <a:r>
-              <a:rPr lang="fi-FI" dirty="0" err="1">
-                <a:solidFill>
-                  <a:schemeClr val="bg2">
-                    <a:lumMod val="50000"/>
-                  </a:schemeClr>
-                </a:solidFill>
-                <a:latin typeface="Avenir Book" charset="0"/>
-                <a:ea typeface="Avenir Book" charset="0"/>
-                <a:cs typeface="Avenir Book" charset="0"/>
-              </a:rPr>
-              <a:t>fetched</a:t>
-            </a:r>
-            <a:r>
-              <a:rPr lang="fi-FI" dirty="0">
-                <a:solidFill>
-                  <a:schemeClr val="bg2">
-                    <a:lumMod val="50000"/>
-                  </a:schemeClr>
-                </a:solidFill>
-                <a:latin typeface="Avenir Book" charset="0"/>
-                <a:ea typeface="Avenir Book" charset="0"/>
-                <a:cs typeface="Avenir Book" charset="0"/>
-              </a:rPr>
-              <a:t> for </a:t>
-            </a:r>
-            <a:r>
-              <a:rPr lang="fi-FI" dirty="0" err="1">
-                <a:solidFill>
-                  <a:schemeClr val="bg2">
-                    <a:lumMod val="50000"/>
-                  </a:schemeClr>
-                </a:solidFill>
-                <a:latin typeface="Avenir Book" charset="0"/>
-                <a:ea typeface="Avenir Book" charset="0"/>
-                <a:cs typeface="Avenir Book" charset="0"/>
-              </a:rPr>
-              <a:t>every</a:t>
-            </a:r>
-            <a:r>
-              <a:rPr lang="fi-FI" dirty="0">
-                <a:solidFill>
-                  <a:schemeClr val="bg2">
-                    <a:lumMod val="50000"/>
-                  </a:schemeClr>
-                </a:solidFill>
-                <a:latin typeface="Avenir Book" charset="0"/>
-                <a:ea typeface="Avenir Book" charset="0"/>
-                <a:cs typeface="Avenir Book" charset="0"/>
-              </a:rPr>
-              <a:t> </a:t>
-            </a:r>
-            <a:r>
-              <a:rPr lang="fi-FI" dirty="0" err="1">
-                <a:solidFill>
-                  <a:schemeClr val="bg2">
-                    <a:lumMod val="50000"/>
-                  </a:schemeClr>
-                </a:solidFill>
-                <a:latin typeface="Avenir Book" charset="0"/>
-                <a:ea typeface="Avenir Book" charset="0"/>
-                <a:cs typeface="Avenir Book" charset="0"/>
-              </a:rPr>
-              <a:t>train</a:t>
-            </a:r>
-            <a:r>
-              <a:rPr lang="fi-FI" dirty="0">
-                <a:solidFill>
-                  <a:schemeClr val="bg2">
-                    <a:lumMod val="50000"/>
-                  </a:schemeClr>
-                </a:solidFill>
-                <a:latin typeface="Avenir Book" charset="0"/>
-                <a:ea typeface="Avenir Book" charset="0"/>
-                <a:cs typeface="Avenir Book" charset="0"/>
-              </a:rPr>
-              <a:t> </a:t>
-            </a:r>
-            <a:r>
-              <a:rPr lang="fi-FI" dirty="0" err="1">
-                <a:solidFill>
-                  <a:schemeClr val="bg2">
-                    <a:lumMod val="50000"/>
-                  </a:schemeClr>
-                </a:solidFill>
-                <a:latin typeface="Avenir Book" charset="0"/>
-                <a:ea typeface="Avenir Book" charset="0"/>
-                <a:cs typeface="Avenir Book" charset="0"/>
-              </a:rPr>
-              <a:t>station</a:t>
-            </a:r>
-            <a:r>
-              <a:rPr lang="fi-FI" dirty="0">
-                <a:solidFill>
-                  <a:schemeClr val="bg2">
-                    <a:lumMod val="50000"/>
-                  </a:schemeClr>
-                </a:solidFill>
-                <a:latin typeface="Avenir Book" charset="0"/>
-                <a:ea typeface="Avenir Book" charset="0"/>
-                <a:cs typeface="Avenir Book" charset="0"/>
-              </a:rPr>
-              <a:t> for </a:t>
-            </a:r>
-            <a:r>
-              <a:rPr lang="fi-FI" dirty="0" err="1">
-                <a:solidFill>
-                  <a:schemeClr val="bg2">
-                    <a:lumMod val="50000"/>
-                  </a:schemeClr>
-                </a:solidFill>
-                <a:latin typeface="Avenir Book" charset="0"/>
-                <a:ea typeface="Avenir Book" charset="0"/>
-                <a:cs typeface="Avenir Book" charset="0"/>
-              </a:rPr>
-              <a:t>every</a:t>
-            </a:r>
-            <a:r>
-              <a:rPr lang="fi-FI" dirty="0">
-                <a:solidFill>
-                  <a:schemeClr val="bg2">
-                    <a:lumMod val="50000"/>
-                  </a:schemeClr>
-                </a:solidFill>
-                <a:latin typeface="Avenir Book" charset="0"/>
-                <a:ea typeface="Avenir Book" charset="0"/>
-                <a:cs typeface="Avenir Book" charset="0"/>
-              </a:rPr>
-              <a:t> </a:t>
-            </a:r>
-            <a:r>
-              <a:rPr lang="fi-FI" dirty="0" err="1">
-                <a:solidFill>
-                  <a:schemeClr val="bg2">
-                    <a:lumMod val="50000"/>
-                  </a:schemeClr>
-                </a:solidFill>
-                <a:latin typeface="Avenir Book" charset="0"/>
-                <a:ea typeface="Avenir Book" charset="0"/>
-                <a:cs typeface="Avenir Book" charset="0"/>
-              </a:rPr>
-              <a:t>hour</a:t>
-            </a:r>
-            <a:r>
-              <a:rPr lang="fi-FI" dirty="0">
-                <a:solidFill>
-                  <a:schemeClr val="bg2">
-                    <a:lumMod val="50000"/>
-                  </a:schemeClr>
-                </a:solidFill>
-                <a:latin typeface="Avenir Book" charset="0"/>
-                <a:ea typeface="Avenir Book" charset="0"/>
-                <a:cs typeface="Avenir Book" charset="0"/>
-              </a:rPr>
-              <a:t> </a:t>
-            </a:r>
-            <a:r>
-              <a:rPr lang="fi-FI" dirty="0" err="1">
-                <a:solidFill>
-                  <a:schemeClr val="bg2">
-                    <a:lumMod val="50000"/>
-                  </a:schemeClr>
-                </a:solidFill>
-                <a:latin typeface="Avenir Book" charset="0"/>
-                <a:ea typeface="Avenir Book" charset="0"/>
-                <a:cs typeface="Avenir Book" charset="0"/>
-              </a:rPr>
-              <a:t>when</a:t>
-            </a:r>
-            <a:r>
-              <a:rPr lang="fi-FI" dirty="0">
-                <a:solidFill>
-                  <a:schemeClr val="bg2">
-                    <a:lumMod val="50000"/>
-                  </a:schemeClr>
-                </a:solidFill>
-                <a:latin typeface="Avenir Book" charset="0"/>
-                <a:ea typeface="Avenir Book" charset="0"/>
-                <a:cs typeface="Avenir Book" charset="0"/>
-              </a:rPr>
-              <a:t> </a:t>
-            </a:r>
-            <a:r>
-              <a:rPr lang="fi-FI" dirty="0" err="1">
-                <a:solidFill>
-                  <a:schemeClr val="bg2">
-                    <a:lumMod val="50000"/>
-                  </a:schemeClr>
-                </a:solidFill>
-                <a:latin typeface="Avenir Book" charset="0"/>
-                <a:ea typeface="Avenir Book" charset="0"/>
-                <a:cs typeface="Avenir Book" charset="0"/>
-              </a:rPr>
-              <a:t>train</a:t>
-            </a:r>
-            <a:r>
-              <a:rPr lang="fi-FI" dirty="0">
-                <a:solidFill>
-                  <a:schemeClr val="bg2">
-                    <a:lumMod val="50000"/>
-                  </a:schemeClr>
-                </a:solidFill>
-                <a:latin typeface="Avenir Book" charset="0"/>
-                <a:ea typeface="Avenir Book" charset="0"/>
-                <a:cs typeface="Avenir Book" charset="0"/>
-              </a:rPr>
-              <a:t> </a:t>
-            </a:r>
-            <a:r>
-              <a:rPr lang="fi-FI" dirty="0" err="1">
-                <a:solidFill>
-                  <a:schemeClr val="bg2">
-                    <a:lumMod val="50000"/>
-                  </a:schemeClr>
-                </a:solidFill>
-                <a:latin typeface="Avenir Book" charset="0"/>
-                <a:ea typeface="Avenir Book" charset="0"/>
-                <a:cs typeface="Avenir Book" charset="0"/>
-              </a:rPr>
-              <a:t>has</a:t>
-            </a:r>
-            <a:r>
-              <a:rPr lang="fi-FI" dirty="0">
-                <a:solidFill>
-                  <a:schemeClr val="bg2">
-                    <a:lumMod val="50000"/>
-                  </a:schemeClr>
-                </a:solidFill>
-                <a:latin typeface="Avenir Book" charset="0"/>
-                <a:ea typeface="Avenir Book" charset="0"/>
-                <a:cs typeface="Avenir Book" charset="0"/>
-              </a:rPr>
-              <a:t> </a:t>
-            </a:r>
-            <a:r>
-              <a:rPr lang="fi-FI" dirty="0" err="1">
-                <a:solidFill>
-                  <a:schemeClr val="bg2">
-                    <a:lumMod val="50000"/>
-                  </a:schemeClr>
-                </a:solidFill>
-                <a:latin typeface="Avenir Book" charset="0"/>
-                <a:ea typeface="Avenir Book" charset="0"/>
-                <a:cs typeface="Avenir Book" charset="0"/>
-              </a:rPr>
-              <a:t>passed</a:t>
-            </a:r>
-            <a:r>
-              <a:rPr lang="fi-FI" dirty="0">
-                <a:solidFill>
-                  <a:schemeClr val="bg2">
-                    <a:lumMod val="50000"/>
-                  </a:schemeClr>
-                </a:solidFill>
-                <a:latin typeface="Avenir Book" charset="0"/>
-                <a:ea typeface="Avenir Book" charset="0"/>
-                <a:cs typeface="Avenir Book" charset="0"/>
-              </a:rPr>
-              <a:t> </a:t>
-            </a:r>
-            <a:r>
-              <a:rPr lang="fi-FI" dirty="0" err="1">
-                <a:solidFill>
-                  <a:schemeClr val="bg2">
-                    <a:lumMod val="50000"/>
-                  </a:schemeClr>
-                </a:solidFill>
-                <a:latin typeface="Avenir Book" charset="0"/>
-                <a:ea typeface="Avenir Book" charset="0"/>
-                <a:cs typeface="Avenir Book" charset="0"/>
-              </a:rPr>
-              <a:t>the</a:t>
-            </a:r>
-            <a:r>
-              <a:rPr lang="fi-FI" dirty="0">
-                <a:solidFill>
-                  <a:schemeClr val="bg2">
-                    <a:lumMod val="50000"/>
-                  </a:schemeClr>
-                </a:solidFill>
-                <a:latin typeface="Avenir Book" charset="0"/>
-                <a:ea typeface="Avenir Book" charset="0"/>
-                <a:cs typeface="Avenir Book" charset="0"/>
-              </a:rPr>
-              <a:t> </a:t>
-            </a:r>
-            <a:r>
-              <a:rPr lang="fi-FI" dirty="0" err="1">
-                <a:solidFill>
-                  <a:schemeClr val="bg2">
-                    <a:lumMod val="50000"/>
-                  </a:schemeClr>
-                </a:solidFill>
-                <a:latin typeface="Avenir Book" charset="0"/>
-                <a:ea typeface="Avenir Book" charset="0"/>
-                <a:cs typeface="Avenir Book" charset="0"/>
-              </a:rPr>
-              <a:t>station</a:t>
-            </a:r>
-            <a:endParaRPr lang="fi-FI" dirty="0">
-              <a:solidFill>
-                <a:schemeClr val="bg2">
-                  <a:lumMod val="50000"/>
-                </a:schemeClr>
-              </a:solidFill>
-              <a:latin typeface="Avenir Book" charset="0"/>
-              <a:ea typeface="Avenir Book" charset="0"/>
-              <a:cs typeface="Avenir Book" charset="0"/>
-            </a:endParaRPr>
+              <a:t>19 weather observation parameters near train stations</a:t>
+            </a:r>
           </a:p>
           <a:p>
             <a:pPr marL="198000" indent="-198000">
@@ -10031,7 +9788,7 @@
               </a:lnSpc>
             </a:pPr>
             <a:r>
-              <a:rPr lang="fi-FI" dirty="0" err="1">
+              <a:rPr lang="en-US" dirty="0">
                 <a:solidFill>
                   <a:schemeClr val="bg2">
                     <a:lumMod val="50000"/>
@@ -10041,10 +9798,17 @@
                 <a:ea typeface="Avenir Book" charset="0"/>
                 <a:cs typeface="Avenir Book" charset="0"/>
               </a:rPr>
-              <a:t>Observations</a:t>
-            </a:r>
-            <a:r>
-              <a:rPr lang="fi-FI" dirty="0">
+              <a:t>Four train types (intercity, commuter, cargo, other)</a:t>
+            </a:r>
+          </a:p>
+          <a:p>
+            <a:pPr marL="883800" lvl="1" indent="-198000">
+              <a:lnSpc>
+                <a:spcPct val="130000"/>
+              </a:lnSpc>
+            </a:pPr>
+            <a:r>
+              <a:rPr lang="en-US" dirty="0">
                 <a:solidFill>
                   <a:schemeClr val="bg2">
                     <a:lumMod val="50000"/>
@@ -10054,395 +9818,8 @@
                 <a:ea typeface="Avenir Book" charset="0"/>
                 <a:cs typeface="Avenir Book" charset="0"/>
               </a:rPr>
-              <a:t> </a:t>
-            </a:r>
-            <a:r>
-              <a:rPr lang="fi-FI" dirty="0" err="1">
-                <a:solidFill>
-                  <a:schemeClr val="bg2">
-                    <a:lumMod val="50000"/>
-                  </a:schemeClr>
-                </a:solidFill>
-                <a:latin typeface="Avenir Book" charset="0"/>
-                <a:ea typeface="Avenir Book" charset="0"/>
-                <a:cs typeface="Avenir Book" charset="0"/>
-              </a:rPr>
-              <a:t>fetched</a:t>
-            </a:r>
-            <a:r>
-              <a:rPr lang="fi-FI" dirty="0">
-                <a:solidFill>
-                  <a:schemeClr val="bg2">
-                    <a:lumMod val="50000"/>
-                  </a:schemeClr>
-                </a:solidFill>
-                <a:latin typeface="Avenir Book" charset="0"/>
-                <a:ea typeface="Avenir Book" charset="0"/>
-                <a:cs typeface="Avenir Book" charset="0"/>
-              </a:rPr>
-              <a:t> </a:t>
-            </a:r>
-            <a:r>
-              <a:rPr lang="fi-FI" dirty="0" err="1">
-                <a:solidFill>
-                  <a:schemeClr val="bg2">
-                    <a:lumMod val="50000"/>
-                  </a:schemeClr>
-                </a:solidFill>
-                <a:latin typeface="Avenir Book" charset="0"/>
-                <a:ea typeface="Avenir Book" charset="0"/>
-                <a:cs typeface="Avenir Book" charset="0"/>
-              </a:rPr>
-              <a:t>with</a:t>
-            </a:r>
-            <a:r>
-              <a:rPr lang="fi-FI" dirty="0">
-                <a:solidFill>
-                  <a:schemeClr val="bg2">
-                    <a:lumMod val="50000"/>
-                  </a:schemeClr>
-                </a:solidFill>
-                <a:latin typeface="Avenir Book" charset="0"/>
-                <a:ea typeface="Avenir Book" charset="0"/>
-                <a:cs typeface="Avenir Book" charset="0"/>
-              </a:rPr>
-              <a:t> 100 km radius </a:t>
-            </a:r>
-            <a:r>
-              <a:rPr lang="fi-FI" dirty="0" err="1">
-                <a:solidFill>
-                  <a:schemeClr val="bg2">
-                    <a:lumMod val="50000"/>
-                  </a:schemeClr>
-                </a:solidFill>
-                <a:latin typeface="Avenir Book" charset="0"/>
-                <a:ea typeface="Avenir Book" charset="0"/>
-                <a:cs typeface="Avenir Book" charset="0"/>
-              </a:rPr>
-              <a:t>from</a:t>
-            </a:r>
-            <a:r>
-              <a:rPr lang="fi-FI" dirty="0">
-                <a:solidFill>
-                  <a:schemeClr val="bg2">
-                    <a:lumMod val="50000"/>
-                  </a:schemeClr>
-                </a:solidFill>
-                <a:latin typeface="Avenir Book" charset="0"/>
-                <a:ea typeface="Avenir Book" charset="0"/>
-                <a:cs typeface="Avenir Book" charset="0"/>
-              </a:rPr>
-              <a:t> </a:t>
-            </a:r>
-            <a:r>
-              <a:rPr lang="fi-FI" dirty="0" err="1">
-                <a:solidFill>
-                  <a:schemeClr val="bg2">
-                    <a:lumMod val="50000"/>
-                  </a:schemeClr>
-                </a:solidFill>
-                <a:latin typeface="Avenir Book" charset="0"/>
-                <a:ea typeface="Avenir Book" charset="0"/>
-                <a:cs typeface="Avenir Book" charset="0"/>
-              </a:rPr>
-              <a:t>train</a:t>
-            </a:r>
-            <a:r>
-              <a:rPr lang="fi-FI" dirty="0">
-                <a:solidFill>
-                  <a:schemeClr val="bg2">
-                    <a:lumMod val="50000"/>
-                  </a:schemeClr>
-                </a:solidFill>
-                <a:latin typeface="Avenir Book" charset="0"/>
-                <a:ea typeface="Avenir Book" charset="0"/>
-                <a:cs typeface="Avenir Book" charset="0"/>
-              </a:rPr>
-              <a:t> </a:t>
-            </a:r>
-            <a:r>
-              <a:rPr lang="fi-FI" dirty="0" err="1">
-                <a:solidFill>
-                  <a:schemeClr val="bg2">
-                    <a:lumMod val="50000"/>
-                  </a:schemeClr>
-                </a:solidFill>
-                <a:latin typeface="Avenir Book" charset="0"/>
-                <a:ea typeface="Avenir Book" charset="0"/>
-                <a:cs typeface="Avenir Book" charset="0"/>
-              </a:rPr>
-              <a:t>station</a:t>
-            </a:r>
-            <a:r>
-              <a:rPr lang="fi-FI" dirty="0">
-                <a:solidFill>
-                  <a:schemeClr val="bg2">
-                    <a:lumMod val="50000"/>
-                  </a:schemeClr>
-                </a:solidFill>
-                <a:latin typeface="Avenir Book" charset="0"/>
-                <a:ea typeface="Avenir Book" charset="0"/>
-                <a:cs typeface="Avenir Book" charset="0"/>
-              </a:rPr>
-              <a:t> </a:t>
-            </a:r>
-            <a:r>
-              <a:rPr lang="fi-FI" dirty="0" err="1">
-                <a:solidFill>
-                  <a:schemeClr val="bg2">
-                    <a:lumMod val="50000"/>
-                  </a:schemeClr>
-                </a:solidFill>
-                <a:latin typeface="Avenir Book" charset="0"/>
-                <a:ea typeface="Avenir Book" charset="0"/>
-                <a:cs typeface="Avenir Book" charset="0"/>
-              </a:rPr>
-              <a:t>using</a:t>
-            </a:r>
-            <a:r>
-              <a:rPr lang="fi-FI" dirty="0">
-                <a:solidFill>
-                  <a:schemeClr val="bg2">
-                    <a:lumMod val="50000"/>
-                  </a:schemeClr>
-                </a:solidFill>
-                <a:latin typeface="Avenir Book" charset="0"/>
-                <a:ea typeface="Avenir Book" charset="0"/>
-                <a:cs typeface="Avenir Book" charset="0"/>
-              </a:rPr>
-              <a:t> </a:t>
-            </a:r>
-            <a:r>
-              <a:rPr lang="fi-FI" dirty="0" err="1">
-                <a:solidFill>
-                  <a:schemeClr val="bg2">
-                    <a:lumMod val="50000"/>
-                  </a:schemeClr>
-                </a:solidFill>
-                <a:latin typeface="Avenir Book" charset="0"/>
-                <a:ea typeface="Avenir Book" charset="0"/>
-                <a:cs typeface="Avenir Book" charset="0"/>
-              </a:rPr>
-              <a:t>aggregation</a:t>
-            </a:r>
-            <a:r>
-              <a:rPr lang="fi-FI" dirty="0">
-                <a:solidFill>
-                  <a:schemeClr val="bg2">
-                    <a:lumMod val="50000"/>
-                  </a:schemeClr>
-                </a:solidFill>
-                <a:latin typeface="Avenir Book" charset="0"/>
-                <a:ea typeface="Avenir Book" charset="0"/>
-                <a:cs typeface="Avenir Book" charset="0"/>
-              </a:rPr>
-              <a:t> </a:t>
-            </a:r>
-            <a:r>
-              <a:rPr lang="fi-FI" dirty="0" err="1">
-                <a:solidFill>
-                  <a:schemeClr val="bg2">
-                    <a:lumMod val="50000"/>
-                  </a:schemeClr>
-                </a:solidFill>
-                <a:latin typeface="Avenir Book" charset="0"/>
-                <a:ea typeface="Avenir Book" charset="0"/>
-                <a:cs typeface="Avenir Book" charset="0"/>
-              </a:rPr>
-              <a:t>functions</a:t>
-            </a:r>
-            <a:r>
-              <a:rPr lang="fi-FI" dirty="0">
-                <a:solidFill>
-                  <a:schemeClr val="bg2">
-                    <a:lumMod val="50000"/>
-                  </a:schemeClr>
-                </a:solidFill>
-                <a:latin typeface="Avenir Book" charset="0"/>
-                <a:ea typeface="Avenir Book" charset="0"/>
-                <a:cs typeface="Avenir Book" charset="0"/>
-              </a:rPr>
-              <a:t> (min/</a:t>
-            </a:r>
-            <a:r>
-              <a:rPr lang="fi-FI" dirty="0" err="1">
-                <a:solidFill>
-                  <a:schemeClr val="bg2">
-                    <a:lumMod val="50000"/>
-                  </a:schemeClr>
-                </a:solidFill>
-                <a:latin typeface="Avenir Book" charset="0"/>
-                <a:ea typeface="Avenir Book" charset="0"/>
-                <a:cs typeface="Avenir Book" charset="0"/>
-              </a:rPr>
-              <a:t>max</a:t>
-            </a:r>
-            <a:r>
-              <a:rPr lang="fi-FI" dirty="0">
-                <a:solidFill>
-                  <a:schemeClr val="bg2">
-                    <a:lumMod val="50000"/>
-                  </a:schemeClr>
-                </a:solidFill>
-                <a:latin typeface="Avenir Book" charset="0"/>
-                <a:ea typeface="Avenir Book" charset="0"/>
-                <a:cs typeface="Avenir Book" charset="0"/>
-              </a:rPr>
-              <a:t>/</a:t>
-            </a:r>
-            <a:r>
-              <a:rPr lang="fi-FI" dirty="0" err="1">
-                <a:solidFill>
-                  <a:schemeClr val="bg2">
-                    <a:lumMod val="50000"/>
-                  </a:schemeClr>
-                </a:solidFill>
-                <a:latin typeface="Avenir Book" charset="0"/>
-                <a:ea typeface="Avenir Book" charset="0"/>
-                <a:cs typeface="Avenir Book" charset="0"/>
-              </a:rPr>
-              <a:t>mean</a:t>
-            </a:r>
-            <a:r>
-              <a:rPr lang="fi-FI" dirty="0">
-                <a:solidFill>
-                  <a:schemeClr val="bg2">
-                    <a:lumMod val="50000"/>
-                  </a:schemeClr>
-                </a:solidFill>
-                <a:latin typeface="Avenir Book" charset="0"/>
-                <a:ea typeface="Avenir Book" charset="0"/>
-                <a:cs typeface="Avenir Book" charset="0"/>
-              </a:rPr>
-              <a:t>/</a:t>
-            </a:r>
-            <a:r>
-              <a:rPr lang="fi-FI" dirty="0" err="1">
-                <a:solidFill>
-                  <a:schemeClr val="bg2">
-                    <a:lumMod val="50000"/>
-                  </a:schemeClr>
-                </a:solidFill>
-                <a:latin typeface="Avenir Book" charset="0"/>
-                <a:ea typeface="Avenir Book" charset="0"/>
-                <a:cs typeface="Avenir Book" charset="0"/>
-              </a:rPr>
-              <a:t>count</a:t>
-            </a:r>
-            <a:r>
-              <a:rPr lang="fi-FI" dirty="0">
-                <a:solidFill>
-                  <a:schemeClr val="bg2">
-                    <a:lumMod val="50000"/>
-                  </a:schemeClr>
-                </a:solidFill>
-                <a:latin typeface="Avenir Book" charset="0"/>
-                <a:ea typeface="Avenir Book" charset="0"/>
-                <a:cs typeface="Avenir Book" charset="0"/>
-              </a:rPr>
-              <a:t>) to </a:t>
-            </a:r>
-            <a:r>
-              <a:rPr lang="fi-FI" dirty="0" err="1">
-                <a:solidFill>
-                  <a:schemeClr val="bg2">
-                    <a:lumMod val="50000"/>
-                  </a:schemeClr>
-                </a:solidFill>
-                <a:latin typeface="Avenir Book" charset="0"/>
-                <a:ea typeface="Avenir Book" charset="0"/>
-                <a:cs typeface="Avenir Book" charset="0"/>
-              </a:rPr>
-              <a:t>minimize</a:t>
-            </a:r>
-            <a:r>
-              <a:rPr lang="fi-FI" dirty="0">
-                <a:solidFill>
-                  <a:schemeClr val="bg2">
-                    <a:lumMod val="50000"/>
-                  </a:schemeClr>
-                </a:solidFill>
-                <a:latin typeface="Avenir Book" charset="0"/>
-                <a:ea typeface="Avenir Book" charset="0"/>
-                <a:cs typeface="Avenir Book" charset="0"/>
-              </a:rPr>
-              <a:t> </a:t>
-            </a:r>
-            <a:r>
-              <a:rPr lang="fi-FI" dirty="0" err="1">
-                <a:solidFill>
-                  <a:schemeClr val="bg2">
-                    <a:lumMod val="50000"/>
-                  </a:schemeClr>
-                </a:solidFill>
-                <a:latin typeface="Avenir Book" charset="0"/>
-                <a:ea typeface="Avenir Book" charset="0"/>
-                <a:cs typeface="Avenir Book" charset="0"/>
-              </a:rPr>
-              <a:t>amount</a:t>
-            </a:r>
-            <a:r>
-              <a:rPr lang="fi-FI" dirty="0">
-                <a:solidFill>
-                  <a:schemeClr val="bg2">
-                    <a:lumMod val="50000"/>
-                  </a:schemeClr>
-                </a:solidFill>
-                <a:latin typeface="Avenir Book" charset="0"/>
-                <a:ea typeface="Avenir Book" charset="0"/>
-                <a:cs typeface="Avenir Book" charset="0"/>
-              </a:rPr>
-              <a:t> of </a:t>
-            </a:r>
-            <a:r>
-              <a:rPr lang="fi-FI" dirty="0" err="1">
-                <a:solidFill>
-                  <a:schemeClr val="bg2">
-                    <a:lumMod val="50000"/>
-                  </a:schemeClr>
-                </a:solidFill>
-                <a:latin typeface="Avenir Book" charset="0"/>
-                <a:ea typeface="Avenir Book" charset="0"/>
-                <a:cs typeface="Avenir Book" charset="0"/>
-              </a:rPr>
-              <a:t>missing</a:t>
-            </a:r>
-            <a:r>
-              <a:rPr lang="fi-FI" dirty="0">
-                <a:solidFill>
-                  <a:schemeClr val="bg2">
-                    <a:lumMod val="50000"/>
-                  </a:schemeClr>
-                </a:solidFill>
-                <a:latin typeface="Avenir Book" charset="0"/>
-                <a:ea typeface="Avenir Book" charset="0"/>
-                <a:cs typeface="Avenir Book" charset="0"/>
-              </a:rPr>
-              <a:t> </a:t>
-            </a:r>
-            <a:r>
-              <a:rPr lang="fi-FI" dirty="0" err="1">
-                <a:solidFill>
-                  <a:schemeClr val="bg2">
-                    <a:lumMod val="50000"/>
-                  </a:schemeClr>
-                </a:solidFill>
-                <a:latin typeface="Avenir Book" charset="0"/>
-                <a:ea typeface="Avenir Book" charset="0"/>
-                <a:cs typeface="Avenir Book" charset="0"/>
-              </a:rPr>
-              <a:t>values</a:t>
-            </a:r>
-            <a:endParaRPr lang="fi-FI" dirty="0">
-              <a:solidFill>
-                <a:schemeClr val="bg2">
-                  <a:lumMod val="50000"/>
-                </a:schemeClr>
-              </a:solidFill>
-              <a:latin typeface="Avenir Book" charset="0"/>
-              <a:ea typeface="Avenir Book" charset="0"/>
-              <a:cs typeface="Avenir Book" charset="0"/>
-            </a:endParaRPr>
+              <a:t>We consider only passenger trains</a:t>
+            </a:r>
           </a:p>
           <a:p>
             <a:pPr marL="198000" indent="-198000">
@@ -10451,7 +9828,7 @@
               </a:lnSpc>
             </a:pPr>
             <a:r>
-              <a:rPr lang="fi-FI" dirty="0" err="1">
+              <a:rPr lang="en-US" dirty="0">
                 <a:solidFill>
                   <a:schemeClr val="bg2">
                     <a:lumMod val="50000"/>
@@ -10461,96 +9838,8 @@
                 <a:ea typeface="Avenir Book" charset="0"/>
                 <a:cs typeface="Avenir Book" charset="0"/>
               </a:rPr>
-              <a:t>Calculated</a:t>
-            </a:r>
-            <a:r>
-              <a:rPr lang="fi-FI" dirty="0">
-                <a:solidFill>
-                  <a:schemeClr val="bg2">
-                    <a:lumMod val="50000"/>
-                  </a:schemeClr>
-                </a:solidFill>
-                <a:latin typeface="Avenir Book" charset="0"/>
-                <a:ea typeface="Avenir Book" charset="0"/>
-                <a:cs typeface="Avenir Book" charset="0"/>
-              </a:rPr>
-              <a:t> 3h and 6h </a:t>
-            </a:r>
-            <a:r>
-              <a:rPr lang="fi-FI" dirty="0" err="1">
-                <a:solidFill>
-                  <a:schemeClr val="bg2">
-                    <a:lumMod val="50000"/>
-                  </a:schemeClr>
-                </a:solidFill>
-                <a:latin typeface="Avenir Book" charset="0"/>
-                <a:ea typeface="Avenir Book" charset="0"/>
-                <a:cs typeface="Avenir Book" charset="0"/>
-              </a:rPr>
-              <a:t>precipitation</a:t>
-            </a:r>
-            <a:r>
-              <a:rPr lang="fi-FI" dirty="0">
-                <a:solidFill>
-                  <a:schemeClr val="bg2">
-                    <a:lumMod val="50000"/>
-                  </a:schemeClr>
-                </a:solidFill>
-                <a:latin typeface="Avenir Book" charset="0"/>
-                <a:ea typeface="Avenir Book" charset="0"/>
-                <a:cs typeface="Avenir Book" charset="0"/>
-              </a:rPr>
-              <a:t> </a:t>
-            </a:r>
-            <a:r>
-              <a:rPr lang="fi-FI" dirty="0" err="1">
-                <a:solidFill>
-                  <a:schemeClr val="bg2">
-                    <a:lumMod val="50000"/>
-                  </a:schemeClr>
-                </a:solidFill>
-                <a:latin typeface="Avenir Book" charset="0"/>
-                <a:ea typeface="Avenir Book" charset="0"/>
-                <a:cs typeface="Avenir Book" charset="0"/>
-              </a:rPr>
-              <a:t>accumulation</a:t>
-            </a:r>
-            <a:r>
-              <a:rPr lang="fi-FI" dirty="0">
-                <a:solidFill>
-                  <a:schemeClr val="bg2">
-                    <a:lumMod val="50000"/>
-                  </a:schemeClr>
-                </a:solidFill>
-                <a:latin typeface="Avenir Book" charset="0"/>
-                <a:ea typeface="Avenir Book" charset="0"/>
-                <a:cs typeface="Avenir Book" charset="0"/>
-              </a:rPr>
-              <a:t> </a:t>
-            </a:r>
-            <a:r>
-              <a:rPr lang="fi-FI" dirty="0" err="1">
-                <a:solidFill>
-                  <a:schemeClr val="bg2">
-                    <a:lumMod val="50000"/>
-                  </a:schemeClr>
-                </a:solidFill>
-                <a:latin typeface="Avenir Book" charset="0"/>
-                <a:ea typeface="Avenir Book" charset="0"/>
-                <a:cs typeface="Avenir Book" charset="0"/>
-              </a:rPr>
-              <a:t>sums</a:t>
-            </a:r>
-            <a:endParaRPr lang="fi-FI" dirty="0">
-              <a:solidFill>
-                <a:schemeClr val="bg2">
-                  <a:lumMod val="50000"/>
-                </a:schemeClr>
-              </a:solidFill>
-              <a:latin typeface="Avenir Book" charset="0"/>
-              <a:ea typeface="Avenir Book" charset="0"/>
-              <a:cs typeface="Avenir Book" charset="0"/>
-            </a:endParaRPr>
+              <a:t>Training with data from 2010 to 2018</a:t>
+            </a:r>
           </a:p>
           <a:p>
             <a:pPr marL="883800" lvl="1" indent="-198000">
@@ -10558,6 +9847,58 @@
                 <a:spcPct val="130000"/>
               </a:lnSpc>
             </a:pPr>
+            <a:r>
+              <a:rPr lang="fi-FI" dirty="0">
+                <a:solidFill>
+                  <a:schemeClr val="bg2">
+                    <a:lumMod val="50000"/>
+                  </a:schemeClr>
+                </a:solidFill>
+                <a:latin typeface="Avenir Book" charset="0"/>
+                <a:ea typeface="Avenir Book" charset="0"/>
+                <a:cs typeface="Avenir Book" charset="0"/>
+              </a:rPr>
+              <a:t>Dataset </a:t>
+            </a:r>
+            <a:r>
+              <a:rPr lang="fi-FI" dirty="0" err="1">
+                <a:solidFill>
+                  <a:schemeClr val="bg2">
+                    <a:lumMod val="50000"/>
+                  </a:schemeClr>
+                </a:solidFill>
+                <a:latin typeface="Avenir Book" charset="0"/>
+                <a:ea typeface="Avenir Book" charset="0"/>
+                <a:cs typeface="Avenir Book" charset="0"/>
+              </a:rPr>
+              <a:t>size</a:t>
+            </a:r>
+            <a:r>
+              <a:rPr lang="fi-FI" dirty="0">
+                <a:solidFill>
+                  <a:schemeClr val="bg2">
+                    <a:lumMod val="50000"/>
+                  </a:schemeClr>
+                </a:solidFill>
+                <a:latin typeface="Avenir Book" charset="0"/>
+                <a:ea typeface="Avenir Book" charset="0"/>
+                <a:cs typeface="Avenir Book" charset="0"/>
+              </a:rPr>
+              <a:t> 27 132 093 </a:t>
+            </a:r>
+            <a:r>
+              <a:rPr lang="fi-FI" dirty="0" err="1">
+                <a:solidFill>
+                  <a:schemeClr val="bg2">
+                    <a:lumMod val="50000"/>
+                  </a:schemeClr>
+                </a:solidFill>
+                <a:latin typeface="Avenir Book" charset="0"/>
+                <a:ea typeface="Avenir Book" charset="0"/>
+                <a:cs typeface="Avenir Book" charset="0"/>
+              </a:rPr>
+              <a:t>rows</a:t>
+            </a:r>
             <a:endParaRPr lang="en-US" dirty="0">
               <a:solidFill>
                 <a:schemeClr val="bg2">
@@ -10568,6 +9909,46 @@
               <a:ea typeface="Avenir Book" charset="0"/>
               <a:cs typeface="Avenir Book" charset="0"/>
             </a:endParaRPr>
+          </a:p>
+          <a:p>
+            <a:pPr marL="198000" indent="-198000">
+              <a:lnSpc>
+                <a:spcPct val="130000"/>
+              </a:lnSpc>
+            </a:pPr>
+            <a:r>
+              <a:rPr lang="en-US" dirty="0">
+                <a:solidFill>
+                  <a:schemeClr val="bg2">
+                    <a:lumMod val="50000"/>
+                  </a:schemeClr>
+                </a:solidFill>
+                <a:latin typeface="Avenir Book" charset="0"/>
+                <a:ea typeface="Avenir Book" charset="0"/>
+                <a:cs typeface="Avenir Book" charset="0"/>
+              </a:rPr>
+              <a:t>Features for prediction</a:t>
+            </a:r>
+          </a:p>
+          <a:p>
+            <a:pPr marL="883800" lvl="1" indent="-198000">
+              <a:lnSpc>
+                <a:spcPct val="130000"/>
+              </a:lnSpc>
+            </a:pPr>
+            <a:r>
+              <a:rPr lang="en-US" dirty="0">
+                <a:solidFill>
+                  <a:schemeClr val="bg2">
+                    <a:lumMod val="50000"/>
+                  </a:schemeClr>
+                </a:solidFill>
+                <a:latin typeface="Avenir Book" charset="0"/>
+                <a:ea typeface="Avenir Book" charset="0"/>
+                <a:cs typeface="Avenir Book" charset="0"/>
+              </a:rPr>
+              <a:t>The same weather parameters as in training fetched from Harmonie numerical weather prediction model</a:t>
+            </a:r>
           </a:p>
           <a:p>
             <a:pPr>
@@ -10683,6 +10064,1274 @@
           </a:p>
         </p:txBody>
       </p:sp>
+      <p:pic>
+        <p:nvPicPr>
+          <p:cNvPr id="4" name="Picture 3"/>
+          <p:cNvPicPr>
+            <a:picLocks noChangeAspect="1"/>
+          </p:cNvPicPr>
+          <p:nvPr/>
+        </p:nvPicPr>
+        <p:blipFill>
+          <a:blip r:embed="rId3">
+            <a:extLst>
+              <a:ext uri="{28A0092B-C50C-407E-A947-70E740481C1C}">
+                <a14:useLocalDpi xmlns:a14="http://schemas.microsoft.com/office/drawing/2010/main" val="0"/>
+              </a:ext>
+            </a:extLst>
+          </a:blip>
+          <a:stretch>
+            <a:fillRect/>
+          </a:stretch>
+        </p:blipFill>
+        <p:spPr>
+          <a:xfrm>
+            <a:off x="7101279" y="0"/>
+            <a:ext cx="1471783" cy="2185817"/>
+          </a:xfrm>
+          <a:prstGeom prst="rect">
+            <a:avLst/>
+          </a:prstGeom>
+        </p:spPr>
+      </p:pic>
+    </p:spTree>
+    <p:extLst>
+      <p:ext uri="{BB962C8B-B14F-4D97-AF65-F5344CB8AC3E}">
+        <p14:creationId xmlns:p14="http://schemas.microsoft.com/office/powerpoint/2010/main" val="1779453108"/>
+      </p:ext>
+    </p:extLst>
+  </p:cSld>
+  <p:clrMapOvr>
+    <a:masterClrMapping/>
+  </p:clrMapOvr>
+</p:sld>
+</file>
+
+<file path=ppt/slides/slide11.xml><?xml version="1.0" encoding="utf-8"?>
+<p:sld xmlns:a="http://schemas.openxmlformats.org/drawingml/2006/main" xmlns:r="http://schemas.openxmlformats.org/officeDocument/2006/relationships" xmlns:p="http://schemas.openxmlformats.org/presentationml/2006/main">
+  <p:cSld>
+    <p:spTree>
+      <p:nvGrpSpPr>
+        <p:cNvPr id="1" name=""/>
+        <p:cNvGrpSpPr/>
+        <p:nvPr/>
+      </p:nvGrpSpPr>
+      <p:grpSpPr>
+        <a:xfrm>
+          <a:off x="0" y="0"/>
+          <a:ext cx="0" cy="0"/>
+          <a:chOff x="0" y="0"/>
+          <a:chExt cx="0" cy="0"/>
+        </a:xfrm>
+      </p:grpSpPr>
+      <p:sp>
+        <p:nvSpPr>
+          <p:cNvPr id="2" name="Title 1"/>
+          <p:cNvSpPr>
+            <a:spLocks noGrp="1"/>
+          </p:cNvSpPr>
+          <p:nvPr>
+            <p:ph type="title"/>
+          </p:nvPr>
+        </p:nvSpPr>
+        <p:spPr/>
+        <p:txBody>
+          <a:bodyPr/>
+          <a:lstStyle/>
+          <a:p>
+            <a:r>
+              <a:rPr lang="en-US" b="1" dirty="0">
+                <a:latin typeface="Avenir Black" charset="0"/>
+                <a:ea typeface="Avenir Black" charset="0"/>
+                <a:cs typeface="Avenir Black" charset="0"/>
+              </a:rPr>
+              <a:t>Data pre-processing</a:t>
+            </a:r>
+          </a:p>
+        </p:txBody>
+      </p:sp>
+      <p:sp>
+        <p:nvSpPr>
+          <p:cNvPr id="3" name="Content Placeholder 2"/>
+          <p:cNvSpPr>
+            <a:spLocks noGrp="1"/>
+          </p:cNvSpPr>
+          <p:nvPr>
+            <p:ph idx="1"/>
+          </p:nvPr>
+        </p:nvSpPr>
+        <p:spPr>
+          <a:xfrm>
+            <a:off x="642501" y="1663403"/>
+            <a:ext cx="8599095" cy="4242814"/>
+          </a:xfrm>
+        </p:spPr>
+        <p:txBody>
+          <a:bodyPr>
+            <a:normAutofit/>
+          </a:bodyPr>
+          <a:lstStyle/>
+          <a:p>
+            <a:pPr marL="198000" indent="-198000">
+              <a:lnSpc>
+                <a:spcPct val="130000"/>
+              </a:lnSpc>
+            </a:pPr>
+            <a:r>
+              <a:rPr lang="fi-FI" dirty="0" err="1">
+                <a:solidFill>
+                  <a:schemeClr val="bg2">
+                    <a:lumMod val="50000"/>
+                  </a:schemeClr>
+                </a:solidFill>
+                <a:latin typeface="Avenir Book" charset="0"/>
+                <a:ea typeface="Avenir Book" charset="0"/>
+                <a:cs typeface="Avenir Book" charset="0"/>
+              </a:rPr>
+              <a:t>Weather</a:t>
+            </a:r>
+            <a:r>
+              <a:rPr lang="fi-FI" dirty="0">
+                <a:solidFill>
+                  <a:schemeClr val="bg2">
+                    <a:lumMod val="50000"/>
+                  </a:schemeClr>
+                </a:solidFill>
+                <a:latin typeface="Avenir Book" charset="0"/>
+                <a:ea typeface="Avenir Book" charset="0"/>
+                <a:cs typeface="Avenir Book" charset="0"/>
+              </a:rPr>
+              <a:t> </a:t>
+            </a:r>
+            <a:r>
+              <a:rPr lang="fi-FI" dirty="0" err="1">
+                <a:solidFill>
+                  <a:schemeClr val="bg2">
+                    <a:lumMod val="50000"/>
+                  </a:schemeClr>
+                </a:solidFill>
+                <a:latin typeface="Avenir Book" charset="0"/>
+                <a:ea typeface="Avenir Book" charset="0"/>
+                <a:cs typeface="Avenir Book" charset="0"/>
+              </a:rPr>
+              <a:t>observation</a:t>
+            </a:r>
+            <a:r>
+              <a:rPr lang="fi-FI" dirty="0">
+                <a:solidFill>
+                  <a:schemeClr val="bg2">
+                    <a:lumMod val="50000"/>
+                  </a:schemeClr>
+                </a:solidFill>
+                <a:latin typeface="Avenir Book" charset="0"/>
+                <a:ea typeface="Avenir Book" charset="0"/>
+                <a:cs typeface="Avenir Book" charset="0"/>
+              </a:rPr>
+              <a:t> </a:t>
+            </a:r>
+            <a:r>
+              <a:rPr lang="fi-FI" dirty="0" err="1">
+                <a:solidFill>
+                  <a:schemeClr val="bg2">
+                    <a:lumMod val="50000"/>
+                  </a:schemeClr>
+                </a:solidFill>
+                <a:latin typeface="Avenir Book" charset="0"/>
+                <a:ea typeface="Avenir Book" charset="0"/>
+                <a:cs typeface="Avenir Book" charset="0"/>
+              </a:rPr>
+              <a:t>fetched</a:t>
+            </a:r>
+            <a:r>
+              <a:rPr lang="fi-FI" dirty="0">
+                <a:solidFill>
+                  <a:schemeClr val="bg2">
+                    <a:lumMod val="50000"/>
+                  </a:schemeClr>
+                </a:solidFill>
+                <a:latin typeface="Avenir Book" charset="0"/>
+                <a:ea typeface="Avenir Book" charset="0"/>
+                <a:cs typeface="Avenir Book" charset="0"/>
+              </a:rPr>
+              <a:t> for </a:t>
+            </a:r>
+            <a:r>
+              <a:rPr lang="fi-FI" dirty="0" err="1">
+                <a:solidFill>
+                  <a:schemeClr val="bg2">
+                    <a:lumMod val="50000"/>
+                  </a:schemeClr>
+                </a:solidFill>
+                <a:latin typeface="Avenir Book" charset="0"/>
+                <a:ea typeface="Avenir Book" charset="0"/>
+                <a:cs typeface="Avenir Book" charset="0"/>
+              </a:rPr>
+              <a:t>every</a:t>
+            </a:r>
+            <a:r>
+              <a:rPr lang="fi-FI" dirty="0">
+                <a:solidFill>
+                  <a:schemeClr val="bg2">
+                    <a:lumMod val="50000"/>
+                  </a:schemeClr>
+                </a:solidFill>
+                <a:latin typeface="Avenir Book" charset="0"/>
+                <a:ea typeface="Avenir Book" charset="0"/>
+                <a:cs typeface="Avenir Book" charset="0"/>
+              </a:rPr>
+              <a:t> </a:t>
+            </a:r>
+            <a:r>
+              <a:rPr lang="fi-FI" dirty="0" err="1">
+                <a:solidFill>
+                  <a:schemeClr val="bg2">
+                    <a:lumMod val="50000"/>
+                  </a:schemeClr>
+                </a:solidFill>
+                <a:latin typeface="Avenir Book" charset="0"/>
+                <a:ea typeface="Avenir Book" charset="0"/>
+                <a:cs typeface="Avenir Book" charset="0"/>
+              </a:rPr>
+              <a:t>train</a:t>
+            </a:r>
+            <a:r>
+              <a:rPr lang="fi-FI" dirty="0">
+                <a:solidFill>
+                  <a:schemeClr val="bg2">
+                    <a:lumMod val="50000"/>
+                  </a:schemeClr>
+                </a:solidFill>
+                <a:latin typeface="Avenir Book" charset="0"/>
+                <a:ea typeface="Avenir Book" charset="0"/>
+                <a:cs typeface="Avenir Book" charset="0"/>
+              </a:rPr>
+              <a:t> </a:t>
+            </a:r>
+            <a:r>
+              <a:rPr lang="fi-FI" dirty="0" err="1">
+                <a:solidFill>
+                  <a:schemeClr val="bg2">
+                    <a:lumMod val="50000"/>
+                  </a:schemeClr>
+                </a:solidFill>
+                <a:latin typeface="Avenir Book" charset="0"/>
+                <a:ea typeface="Avenir Book" charset="0"/>
+                <a:cs typeface="Avenir Book" charset="0"/>
+              </a:rPr>
+              <a:t>station</a:t>
+            </a:r>
+            <a:r>
+              <a:rPr lang="fi-FI" dirty="0">
+                <a:solidFill>
+                  <a:schemeClr val="bg2">
+                    <a:lumMod val="50000"/>
+                  </a:schemeClr>
+                </a:solidFill>
+                <a:latin typeface="Avenir Book" charset="0"/>
+                <a:ea typeface="Avenir Book" charset="0"/>
+                <a:cs typeface="Avenir Book" charset="0"/>
+              </a:rPr>
+              <a:t> for </a:t>
+            </a:r>
+            <a:r>
+              <a:rPr lang="fi-FI" dirty="0" err="1">
+                <a:solidFill>
+                  <a:schemeClr val="bg2">
+                    <a:lumMod val="50000"/>
+                  </a:schemeClr>
+                </a:solidFill>
+                <a:latin typeface="Avenir Book" charset="0"/>
+                <a:ea typeface="Avenir Book" charset="0"/>
+                <a:cs typeface="Avenir Book" charset="0"/>
+              </a:rPr>
+              <a:t>every</a:t>
+            </a:r>
+            <a:r>
+              <a:rPr lang="fi-FI" dirty="0">
+                <a:solidFill>
+                  <a:schemeClr val="bg2">
+                    <a:lumMod val="50000"/>
+                  </a:schemeClr>
+                </a:solidFill>
+                <a:latin typeface="Avenir Book" charset="0"/>
+                <a:ea typeface="Avenir Book" charset="0"/>
+                <a:cs typeface="Avenir Book" charset="0"/>
+              </a:rPr>
+              <a:t> </a:t>
+            </a:r>
+            <a:r>
+              <a:rPr lang="fi-FI" dirty="0" err="1">
+                <a:solidFill>
+                  <a:schemeClr val="bg2">
+                    <a:lumMod val="50000"/>
+                  </a:schemeClr>
+                </a:solidFill>
+                <a:latin typeface="Avenir Book" charset="0"/>
+                <a:ea typeface="Avenir Book" charset="0"/>
+                <a:cs typeface="Avenir Book" charset="0"/>
+              </a:rPr>
+              <a:t>hour</a:t>
+            </a:r>
+            <a:r>
+              <a:rPr lang="fi-FI" dirty="0">
+                <a:solidFill>
+                  <a:schemeClr val="bg2">
+                    <a:lumMod val="50000"/>
+                  </a:schemeClr>
+                </a:solidFill>
+                <a:latin typeface="Avenir Book" charset="0"/>
+                <a:ea typeface="Avenir Book" charset="0"/>
+                <a:cs typeface="Avenir Book" charset="0"/>
+              </a:rPr>
+              <a:t> </a:t>
+            </a:r>
+            <a:r>
+              <a:rPr lang="fi-FI" dirty="0" err="1">
+                <a:solidFill>
+                  <a:schemeClr val="bg2">
+                    <a:lumMod val="50000"/>
+                  </a:schemeClr>
+                </a:solidFill>
+                <a:latin typeface="Avenir Book" charset="0"/>
+                <a:ea typeface="Avenir Book" charset="0"/>
+                <a:cs typeface="Avenir Book" charset="0"/>
+              </a:rPr>
+              <a:t>when</a:t>
+            </a:r>
+            <a:r>
+              <a:rPr lang="fi-FI" dirty="0">
+                <a:solidFill>
+                  <a:schemeClr val="bg2">
+                    <a:lumMod val="50000"/>
+                  </a:schemeClr>
+                </a:solidFill>
+                <a:latin typeface="Avenir Book" charset="0"/>
+                <a:ea typeface="Avenir Book" charset="0"/>
+                <a:cs typeface="Avenir Book" charset="0"/>
+              </a:rPr>
+              <a:t> </a:t>
+            </a:r>
+            <a:r>
+              <a:rPr lang="fi-FI" dirty="0" err="1">
+                <a:solidFill>
+                  <a:schemeClr val="bg2">
+                    <a:lumMod val="50000"/>
+                  </a:schemeClr>
+                </a:solidFill>
+                <a:latin typeface="Avenir Book" charset="0"/>
+                <a:ea typeface="Avenir Book" charset="0"/>
+                <a:cs typeface="Avenir Book" charset="0"/>
+              </a:rPr>
+              <a:t>train</a:t>
+            </a:r>
+            <a:r>
+              <a:rPr lang="fi-FI" dirty="0">
+                <a:solidFill>
+                  <a:schemeClr val="bg2">
+                    <a:lumMod val="50000"/>
+                  </a:schemeClr>
+                </a:solidFill>
+                <a:latin typeface="Avenir Book" charset="0"/>
+                <a:ea typeface="Avenir Book" charset="0"/>
+                <a:cs typeface="Avenir Book" charset="0"/>
+              </a:rPr>
+              <a:t> </a:t>
+            </a:r>
+            <a:r>
+              <a:rPr lang="fi-FI" dirty="0" err="1">
+                <a:solidFill>
+                  <a:schemeClr val="bg2">
+                    <a:lumMod val="50000"/>
+                  </a:schemeClr>
+                </a:solidFill>
+                <a:latin typeface="Avenir Book" charset="0"/>
+                <a:ea typeface="Avenir Book" charset="0"/>
+                <a:cs typeface="Avenir Book" charset="0"/>
+              </a:rPr>
+              <a:t>has</a:t>
+            </a:r>
+            <a:r>
+              <a:rPr lang="fi-FI" dirty="0">
+                <a:solidFill>
+                  <a:schemeClr val="bg2">
+                    <a:lumMod val="50000"/>
+                  </a:schemeClr>
+                </a:solidFill>
+                <a:latin typeface="Avenir Book" charset="0"/>
+                <a:ea typeface="Avenir Book" charset="0"/>
+                <a:cs typeface="Avenir Book" charset="0"/>
+              </a:rPr>
+              <a:t> </a:t>
+            </a:r>
+            <a:r>
+              <a:rPr lang="fi-FI" dirty="0" err="1">
+                <a:solidFill>
+                  <a:schemeClr val="bg2">
+                    <a:lumMod val="50000"/>
+                  </a:schemeClr>
+                </a:solidFill>
+                <a:latin typeface="Avenir Book" charset="0"/>
+                <a:ea typeface="Avenir Book" charset="0"/>
+                <a:cs typeface="Avenir Book" charset="0"/>
+              </a:rPr>
+              <a:t>passed</a:t>
+            </a:r>
+            <a:r>
+              <a:rPr lang="fi-FI" dirty="0">
+                <a:solidFill>
+                  <a:schemeClr val="bg2">
+                    <a:lumMod val="50000"/>
+                  </a:schemeClr>
+                </a:solidFill>
+                <a:latin typeface="Avenir Book" charset="0"/>
+                <a:ea typeface="Avenir Book" charset="0"/>
+                <a:cs typeface="Avenir Book" charset="0"/>
+              </a:rPr>
+              <a:t> </a:t>
+            </a:r>
+            <a:r>
+              <a:rPr lang="fi-FI" dirty="0" err="1">
+                <a:solidFill>
+                  <a:schemeClr val="bg2">
+                    <a:lumMod val="50000"/>
+                  </a:schemeClr>
+                </a:solidFill>
+                <a:latin typeface="Avenir Book" charset="0"/>
+                <a:ea typeface="Avenir Book" charset="0"/>
+                <a:cs typeface="Avenir Book" charset="0"/>
+              </a:rPr>
+              <a:t>the</a:t>
+            </a:r>
+            <a:r>
+              <a:rPr lang="fi-FI" dirty="0">
+                <a:solidFill>
+                  <a:schemeClr val="bg2">
+                    <a:lumMod val="50000"/>
+                  </a:schemeClr>
+                </a:solidFill>
+                <a:latin typeface="Avenir Book" charset="0"/>
+                <a:ea typeface="Avenir Book" charset="0"/>
+                <a:cs typeface="Avenir Book" charset="0"/>
+              </a:rPr>
+              <a:t> </a:t>
+            </a:r>
+            <a:r>
+              <a:rPr lang="fi-FI" dirty="0" err="1">
+                <a:solidFill>
+                  <a:schemeClr val="bg2">
+                    <a:lumMod val="50000"/>
+                  </a:schemeClr>
+                </a:solidFill>
+                <a:latin typeface="Avenir Book" charset="0"/>
+                <a:ea typeface="Avenir Book" charset="0"/>
+                <a:cs typeface="Avenir Book" charset="0"/>
+              </a:rPr>
+              <a:t>station</a:t>
+            </a:r>
+            <a:endParaRPr lang="fi-FI" dirty="0">
+              <a:solidFill>
+                <a:schemeClr val="bg2">
+                  <a:lumMod val="50000"/>
+                </a:schemeClr>
+              </a:solidFill>
+              <a:latin typeface="Avenir Book" charset="0"/>
+              <a:ea typeface="Avenir Book" charset="0"/>
+              <a:cs typeface="Avenir Book" charset="0"/>
+            </a:endParaRPr>
+          </a:p>
+          <a:p>
+            <a:pPr marL="198000" indent="-198000">
+              <a:lnSpc>
+                <a:spcPct val="130000"/>
+              </a:lnSpc>
+            </a:pPr>
+            <a:r>
+              <a:rPr lang="fi-FI" dirty="0" err="1">
+                <a:solidFill>
+                  <a:schemeClr val="bg2">
+                    <a:lumMod val="50000"/>
+                  </a:schemeClr>
+                </a:solidFill>
+                <a:latin typeface="Avenir Book" charset="0"/>
+                <a:ea typeface="Avenir Book" charset="0"/>
+                <a:cs typeface="Avenir Book" charset="0"/>
+              </a:rPr>
+              <a:t>Observations</a:t>
+            </a:r>
+            <a:r>
+              <a:rPr lang="fi-FI" dirty="0">
+                <a:solidFill>
+                  <a:schemeClr val="bg2">
+                    <a:lumMod val="50000"/>
+                  </a:schemeClr>
+                </a:solidFill>
+                <a:latin typeface="Avenir Book" charset="0"/>
+                <a:ea typeface="Avenir Book" charset="0"/>
+                <a:cs typeface="Avenir Book" charset="0"/>
+              </a:rPr>
+              <a:t> </a:t>
+            </a:r>
+            <a:r>
+              <a:rPr lang="fi-FI" dirty="0" err="1">
+                <a:solidFill>
+                  <a:schemeClr val="bg2">
+                    <a:lumMod val="50000"/>
+                  </a:schemeClr>
+                </a:solidFill>
+                <a:latin typeface="Avenir Book" charset="0"/>
+                <a:ea typeface="Avenir Book" charset="0"/>
+                <a:cs typeface="Avenir Book" charset="0"/>
+              </a:rPr>
+              <a:t>fetched</a:t>
+            </a:r>
+            <a:r>
+              <a:rPr lang="fi-FI" dirty="0">
+                <a:solidFill>
+                  <a:schemeClr val="bg2">
+                    <a:lumMod val="50000"/>
+                  </a:schemeClr>
+                </a:solidFill>
+                <a:latin typeface="Avenir Book" charset="0"/>
+                <a:ea typeface="Avenir Book" charset="0"/>
+                <a:cs typeface="Avenir Book" charset="0"/>
+              </a:rPr>
+              <a:t> </a:t>
+            </a:r>
+            <a:r>
+              <a:rPr lang="fi-FI" dirty="0" err="1">
+                <a:solidFill>
+                  <a:schemeClr val="bg2">
+                    <a:lumMod val="50000"/>
+                  </a:schemeClr>
+                </a:solidFill>
+                <a:latin typeface="Avenir Book" charset="0"/>
+                <a:ea typeface="Avenir Book" charset="0"/>
+                <a:cs typeface="Avenir Book" charset="0"/>
+              </a:rPr>
+              <a:t>with</a:t>
+            </a:r>
+            <a:r>
+              <a:rPr lang="fi-FI" dirty="0">
+                <a:solidFill>
+                  <a:schemeClr val="bg2">
+                    <a:lumMod val="50000"/>
+                  </a:schemeClr>
+                </a:solidFill>
+                <a:latin typeface="Avenir Book" charset="0"/>
+                <a:ea typeface="Avenir Book" charset="0"/>
+                <a:cs typeface="Avenir Book" charset="0"/>
+              </a:rPr>
+              <a:t> 100 km radius </a:t>
+            </a:r>
+            <a:r>
+              <a:rPr lang="fi-FI" dirty="0" err="1">
+                <a:solidFill>
+                  <a:schemeClr val="bg2">
+                    <a:lumMod val="50000"/>
+                  </a:schemeClr>
+                </a:solidFill>
+                <a:latin typeface="Avenir Book" charset="0"/>
+                <a:ea typeface="Avenir Book" charset="0"/>
+                <a:cs typeface="Avenir Book" charset="0"/>
+              </a:rPr>
+              <a:t>from</a:t>
+            </a:r>
+            <a:r>
+              <a:rPr lang="fi-FI" dirty="0">
+                <a:solidFill>
+                  <a:schemeClr val="bg2">
+                    <a:lumMod val="50000"/>
+                  </a:schemeClr>
+                </a:solidFill>
+                <a:latin typeface="Avenir Book" charset="0"/>
+                <a:ea typeface="Avenir Book" charset="0"/>
+                <a:cs typeface="Avenir Book" charset="0"/>
+              </a:rPr>
+              <a:t> </a:t>
+            </a:r>
+            <a:r>
+              <a:rPr lang="fi-FI" dirty="0" err="1">
+                <a:solidFill>
+                  <a:schemeClr val="bg2">
+                    <a:lumMod val="50000"/>
+                  </a:schemeClr>
+                </a:solidFill>
+                <a:latin typeface="Avenir Book" charset="0"/>
+                <a:ea typeface="Avenir Book" charset="0"/>
+                <a:cs typeface="Avenir Book" charset="0"/>
+              </a:rPr>
+              <a:t>train</a:t>
+            </a:r>
+            <a:r>
+              <a:rPr lang="fi-FI" dirty="0">
+                <a:solidFill>
+                  <a:schemeClr val="bg2">
+                    <a:lumMod val="50000"/>
+                  </a:schemeClr>
+                </a:solidFill>
+                <a:latin typeface="Avenir Book" charset="0"/>
+                <a:ea typeface="Avenir Book" charset="0"/>
+                <a:cs typeface="Avenir Book" charset="0"/>
+              </a:rPr>
+              <a:t> </a:t>
+            </a:r>
+            <a:r>
+              <a:rPr lang="fi-FI" dirty="0" err="1">
+                <a:solidFill>
+                  <a:schemeClr val="bg2">
+                    <a:lumMod val="50000"/>
+                  </a:schemeClr>
+                </a:solidFill>
+                <a:latin typeface="Avenir Book" charset="0"/>
+                <a:ea typeface="Avenir Book" charset="0"/>
+                <a:cs typeface="Avenir Book" charset="0"/>
+              </a:rPr>
+              <a:t>station</a:t>
+            </a:r>
+            <a:r>
+              <a:rPr lang="fi-FI" dirty="0">
+                <a:solidFill>
+                  <a:schemeClr val="bg2">
+                    <a:lumMod val="50000"/>
+                  </a:schemeClr>
+                </a:solidFill>
+                <a:latin typeface="Avenir Book" charset="0"/>
+                <a:ea typeface="Avenir Book" charset="0"/>
+                <a:cs typeface="Avenir Book" charset="0"/>
+              </a:rPr>
+              <a:t> </a:t>
+            </a:r>
+            <a:r>
+              <a:rPr lang="fi-FI" dirty="0" err="1">
+                <a:solidFill>
+                  <a:schemeClr val="bg2">
+                    <a:lumMod val="50000"/>
+                  </a:schemeClr>
+                </a:solidFill>
+                <a:latin typeface="Avenir Book" charset="0"/>
+                <a:ea typeface="Avenir Book" charset="0"/>
+                <a:cs typeface="Avenir Book" charset="0"/>
+              </a:rPr>
+              <a:t>using</a:t>
+            </a:r>
+            <a:r>
+              <a:rPr lang="fi-FI" dirty="0">
+                <a:solidFill>
+                  <a:schemeClr val="bg2">
+                    <a:lumMod val="50000"/>
+                  </a:schemeClr>
+                </a:solidFill>
+                <a:latin typeface="Avenir Book" charset="0"/>
+                <a:ea typeface="Avenir Book" charset="0"/>
+                <a:cs typeface="Avenir Book" charset="0"/>
+              </a:rPr>
+              <a:t> </a:t>
+            </a:r>
+            <a:r>
+              <a:rPr lang="fi-FI" dirty="0" err="1">
+                <a:solidFill>
+                  <a:schemeClr val="bg2">
+                    <a:lumMod val="50000"/>
+                  </a:schemeClr>
+                </a:solidFill>
+                <a:latin typeface="Avenir Book" charset="0"/>
+                <a:ea typeface="Avenir Book" charset="0"/>
+                <a:cs typeface="Avenir Book" charset="0"/>
+              </a:rPr>
+              <a:t>aggregation</a:t>
+            </a:r>
+            <a:r>
+              <a:rPr lang="fi-FI" dirty="0">
+                <a:solidFill>
+                  <a:schemeClr val="bg2">
+                    <a:lumMod val="50000"/>
+                  </a:schemeClr>
+                </a:solidFill>
+                <a:latin typeface="Avenir Book" charset="0"/>
+                <a:ea typeface="Avenir Book" charset="0"/>
+                <a:cs typeface="Avenir Book" charset="0"/>
+              </a:rPr>
+              <a:t> </a:t>
+            </a:r>
+            <a:r>
+              <a:rPr lang="fi-FI" dirty="0" err="1">
+                <a:solidFill>
+                  <a:schemeClr val="bg2">
+                    <a:lumMod val="50000"/>
+                  </a:schemeClr>
+                </a:solidFill>
+                <a:latin typeface="Avenir Book" charset="0"/>
+                <a:ea typeface="Avenir Book" charset="0"/>
+                <a:cs typeface="Avenir Book" charset="0"/>
+              </a:rPr>
+              <a:t>functions</a:t>
+            </a:r>
+            <a:r>
+              <a:rPr lang="fi-FI" dirty="0">
+                <a:solidFill>
+                  <a:schemeClr val="bg2">
+                    <a:lumMod val="50000"/>
+                  </a:schemeClr>
+                </a:solidFill>
+                <a:latin typeface="Avenir Book" charset="0"/>
+                <a:ea typeface="Avenir Book" charset="0"/>
+                <a:cs typeface="Avenir Book" charset="0"/>
+              </a:rPr>
+              <a:t> (min/</a:t>
+            </a:r>
+            <a:r>
+              <a:rPr lang="fi-FI" dirty="0" err="1">
+                <a:solidFill>
+                  <a:schemeClr val="bg2">
+                    <a:lumMod val="50000"/>
+                  </a:schemeClr>
+                </a:solidFill>
+                <a:latin typeface="Avenir Book" charset="0"/>
+                <a:ea typeface="Avenir Book" charset="0"/>
+                <a:cs typeface="Avenir Book" charset="0"/>
+              </a:rPr>
+              <a:t>max</a:t>
+            </a:r>
+            <a:r>
+              <a:rPr lang="fi-FI" dirty="0">
+                <a:solidFill>
+                  <a:schemeClr val="bg2">
+                    <a:lumMod val="50000"/>
+                  </a:schemeClr>
+                </a:solidFill>
+                <a:latin typeface="Avenir Book" charset="0"/>
+                <a:ea typeface="Avenir Book" charset="0"/>
+                <a:cs typeface="Avenir Book" charset="0"/>
+              </a:rPr>
+              <a:t>/</a:t>
+            </a:r>
+            <a:r>
+              <a:rPr lang="fi-FI" dirty="0" err="1">
+                <a:solidFill>
+                  <a:schemeClr val="bg2">
+                    <a:lumMod val="50000"/>
+                  </a:schemeClr>
+                </a:solidFill>
+                <a:latin typeface="Avenir Book" charset="0"/>
+                <a:ea typeface="Avenir Book" charset="0"/>
+                <a:cs typeface="Avenir Book" charset="0"/>
+              </a:rPr>
+              <a:t>mean</a:t>
+            </a:r>
+            <a:r>
+              <a:rPr lang="fi-FI" dirty="0">
+                <a:solidFill>
+                  <a:schemeClr val="bg2">
+                    <a:lumMod val="50000"/>
+                  </a:schemeClr>
+                </a:solidFill>
+                <a:latin typeface="Avenir Book" charset="0"/>
+                <a:ea typeface="Avenir Book" charset="0"/>
+                <a:cs typeface="Avenir Book" charset="0"/>
+              </a:rPr>
+              <a:t>/</a:t>
+            </a:r>
+            <a:r>
+              <a:rPr lang="fi-FI" dirty="0" err="1">
+                <a:solidFill>
+                  <a:schemeClr val="bg2">
+                    <a:lumMod val="50000"/>
+                  </a:schemeClr>
+                </a:solidFill>
+                <a:latin typeface="Avenir Book" charset="0"/>
+                <a:ea typeface="Avenir Book" charset="0"/>
+                <a:cs typeface="Avenir Book" charset="0"/>
+              </a:rPr>
+              <a:t>count</a:t>
+            </a:r>
+            <a:r>
+              <a:rPr lang="fi-FI" dirty="0">
+                <a:solidFill>
+                  <a:schemeClr val="bg2">
+                    <a:lumMod val="50000"/>
+                  </a:schemeClr>
+                </a:solidFill>
+                <a:latin typeface="Avenir Book" charset="0"/>
+                <a:ea typeface="Avenir Book" charset="0"/>
+                <a:cs typeface="Avenir Book" charset="0"/>
+              </a:rPr>
+              <a:t>) to </a:t>
+            </a:r>
+            <a:r>
+              <a:rPr lang="fi-FI" dirty="0" err="1">
+                <a:solidFill>
+                  <a:schemeClr val="bg2">
+                    <a:lumMod val="50000"/>
+                  </a:schemeClr>
+                </a:solidFill>
+                <a:latin typeface="Avenir Book" charset="0"/>
+                <a:ea typeface="Avenir Book" charset="0"/>
+                <a:cs typeface="Avenir Book" charset="0"/>
+              </a:rPr>
+              <a:t>minimize</a:t>
+            </a:r>
+            <a:r>
+              <a:rPr lang="fi-FI" dirty="0">
+                <a:solidFill>
+                  <a:schemeClr val="bg2">
+                    <a:lumMod val="50000"/>
+                  </a:schemeClr>
+                </a:solidFill>
+                <a:latin typeface="Avenir Book" charset="0"/>
+                <a:ea typeface="Avenir Book" charset="0"/>
+                <a:cs typeface="Avenir Book" charset="0"/>
+              </a:rPr>
+              <a:t> </a:t>
+            </a:r>
+            <a:r>
+              <a:rPr lang="fi-FI" dirty="0" err="1">
+                <a:solidFill>
+                  <a:schemeClr val="bg2">
+                    <a:lumMod val="50000"/>
+                  </a:schemeClr>
+                </a:solidFill>
+                <a:latin typeface="Avenir Book" charset="0"/>
+                <a:ea typeface="Avenir Book" charset="0"/>
+                <a:cs typeface="Avenir Book" charset="0"/>
+              </a:rPr>
+              <a:t>amount</a:t>
+            </a:r>
+            <a:r>
+              <a:rPr lang="fi-FI" dirty="0">
+                <a:solidFill>
+                  <a:schemeClr val="bg2">
+                    <a:lumMod val="50000"/>
+                  </a:schemeClr>
+                </a:solidFill>
+                <a:latin typeface="Avenir Book" charset="0"/>
+                <a:ea typeface="Avenir Book" charset="0"/>
+                <a:cs typeface="Avenir Book" charset="0"/>
+              </a:rPr>
+              <a:t> of </a:t>
+            </a:r>
+            <a:r>
+              <a:rPr lang="fi-FI" dirty="0" err="1">
+                <a:solidFill>
+                  <a:schemeClr val="bg2">
+                    <a:lumMod val="50000"/>
+                  </a:schemeClr>
+                </a:solidFill>
+                <a:latin typeface="Avenir Book" charset="0"/>
+                <a:ea typeface="Avenir Book" charset="0"/>
+                <a:cs typeface="Avenir Book" charset="0"/>
+              </a:rPr>
+              <a:t>missing</a:t>
+            </a:r>
+            <a:r>
+              <a:rPr lang="fi-FI" dirty="0">
+                <a:solidFill>
+                  <a:schemeClr val="bg2">
+                    <a:lumMod val="50000"/>
+                  </a:schemeClr>
+                </a:solidFill>
+                <a:latin typeface="Avenir Book" charset="0"/>
+                <a:ea typeface="Avenir Book" charset="0"/>
+                <a:cs typeface="Avenir Book" charset="0"/>
+              </a:rPr>
+              <a:t> </a:t>
+            </a:r>
+            <a:r>
+              <a:rPr lang="fi-FI" dirty="0" err="1">
+                <a:solidFill>
+                  <a:schemeClr val="bg2">
+                    <a:lumMod val="50000"/>
+                  </a:schemeClr>
+                </a:solidFill>
+                <a:latin typeface="Avenir Book" charset="0"/>
+                <a:ea typeface="Avenir Book" charset="0"/>
+                <a:cs typeface="Avenir Book" charset="0"/>
+              </a:rPr>
+              <a:t>values</a:t>
+            </a:r>
+            <a:endParaRPr lang="fi-FI" dirty="0">
+              <a:solidFill>
+                <a:schemeClr val="bg2">
+                  <a:lumMod val="50000"/>
+                </a:schemeClr>
+              </a:solidFill>
+              <a:latin typeface="Avenir Book" charset="0"/>
+              <a:ea typeface="Avenir Book" charset="0"/>
+              <a:cs typeface="Avenir Book" charset="0"/>
+            </a:endParaRPr>
+          </a:p>
+          <a:p>
+            <a:pPr marL="198000" indent="-198000">
+              <a:lnSpc>
+                <a:spcPct val="130000"/>
+              </a:lnSpc>
+            </a:pPr>
+            <a:r>
+              <a:rPr lang="fi-FI" dirty="0" err="1">
+                <a:solidFill>
+                  <a:schemeClr val="bg2">
+                    <a:lumMod val="50000"/>
+                  </a:schemeClr>
+                </a:solidFill>
+                <a:latin typeface="Avenir Book" charset="0"/>
+                <a:ea typeface="Avenir Book" charset="0"/>
+                <a:cs typeface="Avenir Book" charset="0"/>
+              </a:rPr>
+              <a:t>Calculated</a:t>
+            </a:r>
+            <a:r>
+              <a:rPr lang="fi-FI" dirty="0">
+                <a:solidFill>
+                  <a:schemeClr val="bg2">
+                    <a:lumMod val="50000"/>
+                  </a:schemeClr>
+                </a:solidFill>
+                <a:latin typeface="Avenir Book" charset="0"/>
+                <a:ea typeface="Avenir Book" charset="0"/>
+                <a:cs typeface="Avenir Book" charset="0"/>
+              </a:rPr>
+              <a:t> 3h and 6h </a:t>
+            </a:r>
+            <a:r>
+              <a:rPr lang="fi-FI" dirty="0" err="1">
+                <a:solidFill>
+                  <a:schemeClr val="bg2">
+                    <a:lumMod val="50000"/>
+                  </a:schemeClr>
+                </a:solidFill>
+                <a:latin typeface="Avenir Book" charset="0"/>
+                <a:ea typeface="Avenir Book" charset="0"/>
+                <a:cs typeface="Avenir Book" charset="0"/>
+              </a:rPr>
+              <a:t>precipitation</a:t>
+            </a:r>
+            <a:r>
+              <a:rPr lang="fi-FI" dirty="0">
+                <a:solidFill>
+                  <a:schemeClr val="bg2">
+                    <a:lumMod val="50000"/>
+                  </a:schemeClr>
+                </a:solidFill>
+                <a:latin typeface="Avenir Book" charset="0"/>
+                <a:ea typeface="Avenir Book" charset="0"/>
+                <a:cs typeface="Avenir Book" charset="0"/>
+              </a:rPr>
+              <a:t> </a:t>
+            </a:r>
+            <a:r>
+              <a:rPr lang="fi-FI" dirty="0" err="1">
+                <a:solidFill>
+                  <a:schemeClr val="bg2">
+                    <a:lumMod val="50000"/>
+                  </a:schemeClr>
+                </a:solidFill>
+                <a:latin typeface="Avenir Book" charset="0"/>
+                <a:ea typeface="Avenir Book" charset="0"/>
+                <a:cs typeface="Avenir Book" charset="0"/>
+              </a:rPr>
+              <a:t>accumulation</a:t>
+            </a:r>
+            <a:r>
+              <a:rPr lang="fi-FI" dirty="0">
+                <a:solidFill>
+                  <a:schemeClr val="bg2">
+                    <a:lumMod val="50000"/>
+                  </a:schemeClr>
+                </a:solidFill>
+                <a:latin typeface="Avenir Book" charset="0"/>
+                <a:ea typeface="Avenir Book" charset="0"/>
+                <a:cs typeface="Avenir Book" charset="0"/>
+              </a:rPr>
+              <a:t> </a:t>
+            </a:r>
+            <a:r>
+              <a:rPr lang="fi-FI" dirty="0" err="1">
+                <a:solidFill>
+                  <a:schemeClr val="bg2">
+                    <a:lumMod val="50000"/>
+                  </a:schemeClr>
+                </a:solidFill>
+                <a:latin typeface="Avenir Book" charset="0"/>
+                <a:ea typeface="Avenir Book" charset="0"/>
+                <a:cs typeface="Avenir Book" charset="0"/>
+              </a:rPr>
+              <a:t>sums</a:t>
+            </a:r>
+            <a:endParaRPr lang="fi-FI" dirty="0">
+              <a:solidFill>
+                <a:schemeClr val="bg2">
+                  <a:lumMod val="50000"/>
+                </a:schemeClr>
+              </a:solidFill>
+              <a:latin typeface="Avenir Book" charset="0"/>
+              <a:ea typeface="Avenir Book" charset="0"/>
+              <a:cs typeface="Avenir Book" charset="0"/>
+            </a:endParaRPr>
+          </a:p>
+          <a:p>
+            <a:pPr marL="198000" indent="-198000">
+              <a:lnSpc>
+                <a:spcPct val="130000"/>
+              </a:lnSpc>
+            </a:pPr>
+            <a:r>
+              <a:rPr lang="fi-FI" dirty="0" err="1">
+                <a:solidFill>
+                  <a:schemeClr val="bg2">
+                    <a:lumMod val="50000"/>
+                  </a:schemeClr>
+                </a:solidFill>
+                <a:latin typeface="Avenir Book" charset="0"/>
+                <a:ea typeface="Avenir Book" charset="0"/>
+                <a:cs typeface="Avenir Book" charset="0"/>
+              </a:rPr>
+              <a:t>Tried</a:t>
+            </a:r>
+            <a:r>
+              <a:rPr lang="fi-FI" dirty="0">
+                <a:solidFill>
+                  <a:schemeClr val="bg2">
+                    <a:lumMod val="50000"/>
+                  </a:schemeClr>
+                </a:solidFill>
+                <a:latin typeface="Avenir Book" charset="0"/>
+                <a:ea typeface="Avenir Book" charset="0"/>
+                <a:cs typeface="Avenir Book" charset="0"/>
+              </a:rPr>
+              <a:t> </a:t>
+            </a:r>
+            <a:r>
+              <a:rPr lang="fi-FI" dirty="0" err="1">
+                <a:solidFill>
+                  <a:schemeClr val="bg2">
+                    <a:lumMod val="50000"/>
+                  </a:schemeClr>
+                </a:solidFill>
+                <a:latin typeface="Avenir Book" charset="0"/>
+                <a:ea typeface="Avenir Book" charset="0"/>
+                <a:cs typeface="Avenir Book" charset="0"/>
+              </a:rPr>
+              <a:t>with</a:t>
+            </a:r>
+            <a:r>
+              <a:rPr lang="fi-FI" dirty="0">
+                <a:solidFill>
+                  <a:schemeClr val="bg2">
+                    <a:lumMod val="50000"/>
+                  </a:schemeClr>
+                </a:solidFill>
+                <a:latin typeface="Avenir Book" charset="0"/>
+                <a:ea typeface="Avenir Book" charset="0"/>
+                <a:cs typeface="Avenir Book" charset="0"/>
+              </a:rPr>
+              <a:t> and </a:t>
+            </a:r>
+            <a:r>
+              <a:rPr lang="fi-FI" dirty="0" err="1">
+                <a:solidFill>
+                  <a:schemeClr val="bg2">
+                    <a:lumMod val="50000"/>
+                  </a:schemeClr>
+                </a:solidFill>
+                <a:latin typeface="Avenir Book" charset="0"/>
+                <a:ea typeface="Avenir Book" charset="0"/>
+                <a:cs typeface="Avenir Book" charset="0"/>
+              </a:rPr>
+              <a:t>without</a:t>
+            </a:r>
+            <a:r>
+              <a:rPr lang="fi-FI" dirty="0">
+                <a:solidFill>
+                  <a:schemeClr val="bg2">
+                    <a:lumMod val="50000"/>
+                  </a:schemeClr>
+                </a:solidFill>
+                <a:latin typeface="Avenir Book" charset="0"/>
+                <a:ea typeface="Avenir Book" charset="0"/>
+                <a:cs typeface="Avenir Book" charset="0"/>
+              </a:rPr>
+              <a:t> </a:t>
+            </a:r>
+            <a:r>
+              <a:rPr lang="fi-FI" dirty="0" err="1">
+                <a:solidFill>
+                  <a:schemeClr val="bg2">
+                    <a:lumMod val="50000"/>
+                  </a:schemeClr>
+                </a:solidFill>
+                <a:latin typeface="Avenir Book" charset="0"/>
+                <a:ea typeface="Avenir Book" charset="0"/>
+                <a:cs typeface="Avenir Book" charset="0"/>
+              </a:rPr>
+              <a:t>imputation</a:t>
+            </a:r>
+            <a:r>
+              <a:rPr lang="fi-FI" dirty="0">
+                <a:solidFill>
+                  <a:schemeClr val="bg2">
+                    <a:lumMod val="50000"/>
+                  </a:schemeClr>
+                </a:solidFill>
+                <a:latin typeface="Avenir Book" charset="0"/>
+                <a:ea typeface="Avenir Book" charset="0"/>
+                <a:cs typeface="Avenir Book" charset="0"/>
+              </a:rPr>
+              <a:t> </a:t>
+            </a:r>
+            <a:r>
+              <a:rPr lang="fi-FI">
+                <a:solidFill>
+                  <a:schemeClr val="bg2">
+                    <a:lumMod val="50000"/>
+                  </a:schemeClr>
+                </a:solidFill>
+                <a:latin typeface="Avenir Book" charset="0"/>
+                <a:ea typeface="Avenir Book" charset="0"/>
+                <a:cs typeface="Avenir Book" charset="0"/>
+              </a:rPr>
+              <a:t>and normalisation</a:t>
+            </a:r>
+            <a:endParaRPr lang="fi-FI" dirty="0">
+              <a:solidFill>
+                <a:schemeClr val="bg2">
+                  <a:lumMod val="50000"/>
+                </a:schemeClr>
+              </a:solidFill>
+              <a:latin typeface="Avenir Book" charset="0"/>
+              <a:ea typeface="Avenir Book" charset="0"/>
+              <a:cs typeface="Avenir Book" charset="0"/>
+            </a:endParaRPr>
+          </a:p>
+          <a:p>
+            <a:pPr marL="883800" lvl="1" indent="-198000">
+              <a:lnSpc>
+                <a:spcPct val="130000"/>
+              </a:lnSpc>
+            </a:pPr>
+            <a:endParaRPr lang="en-US" dirty="0">
+              <a:solidFill>
+                <a:schemeClr val="bg2">
+                  <a:lumMod val="50000"/>
+                </a:schemeClr>
+              </a:solidFill>
+              <a:latin typeface="Avenir Book" charset="0"/>
+              <a:ea typeface="Avenir Book" charset="0"/>
+              <a:cs typeface="Avenir Book" charset="0"/>
+            </a:endParaRPr>
+          </a:p>
+          <a:p>
+            <a:pPr>
+              <a:lnSpc>
+                <a:spcPct val="110000"/>
+              </a:lnSpc>
+              <a:buNone/>
+            </a:pPr>
+            <a:endParaRPr lang="en-US" dirty="0">
+              <a:solidFill>
+                <a:schemeClr val="bg2">
+                  <a:lumMod val="50000"/>
+                </a:schemeClr>
+              </a:solidFill>
+              <a:latin typeface="Avenir Book" charset="0"/>
+              <a:ea typeface="Avenir Book" charset="0"/>
+              <a:cs typeface="Avenir Book" charset="0"/>
+            </a:endParaRPr>
+          </a:p>
+          <a:p>
+            <a:pPr>
+              <a:lnSpc>
+                <a:spcPct val="110000"/>
+              </a:lnSpc>
+              <a:buNone/>
+            </a:pPr>
+            <a:endParaRPr lang="en-US" dirty="0">
+              <a:solidFill>
+                <a:schemeClr val="bg2">
+                  <a:lumMod val="50000"/>
+                </a:schemeClr>
+              </a:solidFill>
+              <a:latin typeface="Avenir Book" charset="0"/>
+              <a:ea typeface="Avenir Book" charset="0"/>
+              <a:cs typeface="Avenir Book" charset="0"/>
+            </a:endParaRPr>
+          </a:p>
+          <a:p>
+            <a:pPr marL="198000" indent="-198000">
+              <a:lnSpc>
+                <a:spcPct val="110000"/>
+              </a:lnSpc>
+            </a:pPr>
+            <a:endParaRPr lang="en-US" dirty="0">
+              <a:solidFill>
+                <a:schemeClr val="bg2">
+                  <a:lumMod val="50000"/>
+                </a:schemeClr>
+              </a:solidFill>
+              <a:latin typeface="Avenir Book" charset="0"/>
+              <a:ea typeface="Avenir Book" charset="0"/>
+              <a:cs typeface="Avenir Book" charset="0"/>
+            </a:endParaRPr>
+          </a:p>
+          <a:p>
+            <a:pPr marL="198000" indent="-198000">
+              <a:lnSpc>
+                <a:spcPct val="110000"/>
+              </a:lnSpc>
+            </a:pPr>
+            <a:endParaRPr lang="en-US" dirty="0">
+              <a:solidFill>
+                <a:schemeClr val="bg2">
+                  <a:lumMod val="50000"/>
+                </a:schemeClr>
+              </a:solidFill>
+              <a:latin typeface="Avenir Book" charset="0"/>
+              <a:ea typeface="Avenir Book" charset="0"/>
+              <a:cs typeface="Avenir Book" charset="0"/>
+            </a:endParaRPr>
+          </a:p>
+          <a:p>
+            <a:pPr marL="198000" indent="-198000"/>
+            <a:endParaRPr lang="en-US" dirty="0">
+              <a:latin typeface="Avenir Book" charset="0"/>
+              <a:ea typeface="Avenir Book" charset="0"/>
+              <a:cs typeface="Avenir Book" charset="0"/>
+            </a:endParaRPr>
+          </a:p>
+        </p:txBody>
+      </p:sp>
+      <p:sp>
+        <p:nvSpPr>
+          <p:cNvPr id="5" name="Footer Placeholder 4"/>
+          <p:cNvSpPr>
+            <a:spLocks noGrp="1"/>
+          </p:cNvSpPr>
+          <p:nvPr>
+            <p:ph type="ftr" sz="quarter" idx="11"/>
+          </p:nvPr>
+        </p:nvSpPr>
+        <p:spPr/>
+        <p:txBody>
+          <a:bodyPr/>
+          <a:lstStyle/>
+          <a:p>
+            <a:r>
+              <a:rPr lang="fi-FI" dirty="0" err="1"/>
+              <a:t>Finnish</a:t>
+            </a:r>
+            <a:r>
+              <a:rPr lang="fi-FI" dirty="0"/>
+              <a:t> </a:t>
+            </a:r>
+            <a:r>
+              <a:rPr lang="fi-FI" dirty="0" err="1"/>
+              <a:t>Meteorological</a:t>
+            </a:r>
+            <a:r>
+              <a:rPr lang="fi-FI" dirty="0"/>
+              <a:t> Institute</a:t>
+            </a:r>
+          </a:p>
+        </p:txBody>
+      </p:sp>
     </p:spTree>
     <p:extLst>
       <p:ext uri="{BB962C8B-B14F-4D97-AF65-F5344CB8AC3E}">
@@ -10696,7 +11345,7 @@
 </p:sld>
 </file>
 
-<file path=ppt/slides/slide11.xml><?xml version="1.0" encoding="utf-8"?>
+<file path=ppt/slides/slide12.xml><?xml version="1.0" encoding="utf-8"?>
 <p:sld xmlns:a="http://schemas.openxmlformats.org/drawingml/2006/main" xmlns:r="http://schemas.openxmlformats.org/officeDocument/2006/relationships" xmlns:p="http://schemas.openxmlformats.org/presentationml/2006/main">
   <p:cSld>
     <p:spTree>
@@ -11371,7 +12020,7 @@
 </p:sld>
 </file>
 
-<file path=ppt/slides/slide12.xml><?xml version="1.0" encoding="utf-8"?>
+<file path=ppt/slides/slide13.xml><?xml version="1.0" encoding="utf-8"?>
 <p:sld xmlns:a="http://schemas.openxmlformats.org/drawingml/2006/main" xmlns:r="http://schemas.openxmlformats.org/officeDocument/2006/relationships" xmlns:p="http://schemas.openxmlformats.org/presentationml/2006/main">
   <p:cSld>
     <p:spTree>
@@ -11652,7 +12301,7 @@
 </p:sld>
 </file>
 
-<file path=ppt/slides/slide13.xml><?xml version="1.0" encoding="utf-8"?>
+<file path=ppt/slides/slide14.xml><?xml version="1.0" encoding="utf-8"?>
 <p:sld xmlns:a="http://schemas.openxmlformats.org/drawingml/2006/main" xmlns:r="http://schemas.openxmlformats.org/officeDocument/2006/relationships" xmlns:p="http://schemas.openxmlformats.org/presentationml/2006/main">
   <p:cSld>
     <p:spTree>
@@ -12021,7 +12670,7 @@
 </p:sld>
 </file>
 
-<file path=ppt/slides/slide14.xml><?xml version="1.0" encoding="utf-8"?>
+<file path=ppt/slides/slide15.xml><?xml version="1.0" encoding="utf-8"?>
 <p:sld xmlns:a="http://schemas.openxmlformats.org/drawingml/2006/main" xmlns:r="http://schemas.openxmlformats.org/officeDocument/2006/relationships" xmlns:p="http://schemas.openxmlformats.org/presentationml/2006/main">
   <p:cSld>
     <p:spTree>
@@ -12804,9 +13453,35 @@
           <a:p>
             <a:pPr marL="198000" indent="-198000">
               <a:lnSpc>
-                <a:spcPct val="110000"/>
+                <a:spcPct val="130000"/>
               </a:lnSpc>
             </a:pPr>
+            <a:r>
+              <a:rPr lang="en-US" dirty="0">
+                <a:solidFill>
+                  <a:schemeClr val="bg2">
+                    <a:lumMod val="50000"/>
+                  </a:schemeClr>
+                </a:solidFill>
+                <a:latin typeface="Avenir Book" charset="0"/>
+                <a:ea typeface="Avenir Book" charset="0"/>
+                <a:cs typeface="Avenir Book" charset="0"/>
+              </a:rPr>
+              <a:t>514 </a:t>
+            </a:r>
+            <a:r>
+              <a:rPr lang="en-US" dirty="0" err="1">
+                <a:solidFill>
+                  <a:schemeClr val="bg2">
+                    <a:lumMod val="50000"/>
+                  </a:schemeClr>
+                </a:solidFill>
+                <a:latin typeface="Avenir Book" charset="0"/>
+                <a:ea typeface="Avenir Book" charset="0"/>
+                <a:cs typeface="Avenir Book" charset="0"/>
+              </a:rPr>
+              <a:t>trainstation</a:t>
+            </a:r>
             <a:endParaRPr lang="en-US" dirty="0">
               <a:solidFill>
                 <a:schemeClr val="bg2">
@@ -12922,23 +13597,81 @@
           <a:chExt cx="0" cy="0"/>
         </a:xfrm>
       </p:grpSpPr>
+      <p:sp>
+        <p:nvSpPr>
+          <p:cNvPr id="2" name="Title 1"/>
+          <p:cNvSpPr>
+            <a:spLocks noGrp="1"/>
+          </p:cNvSpPr>
+          <p:nvPr>
+            <p:ph type="title"/>
+          </p:nvPr>
+        </p:nvSpPr>
+        <p:spPr/>
+        <p:txBody>
+          <a:bodyPr/>
+          <a:lstStyle/>
+          <a:p>
+            <a:r>
+              <a:rPr lang="en-US" b="1" dirty="0">
+                <a:latin typeface="Avenir Black" charset="0"/>
+                <a:ea typeface="Avenir Black" charset="0"/>
+                <a:cs typeface="Avenir Black" charset="0"/>
+              </a:rPr>
+              <a:t>Label Data</a:t>
+            </a:r>
+          </a:p>
+        </p:txBody>
+      </p:sp>
+      <p:sp>
+        <p:nvSpPr>
+          <p:cNvPr id="5" name="Footer Placeholder 4"/>
+          <p:cNvSpPr>
+            <a:spLocks noGrp="1"/>
+          </p:cNvSpPr>
+          <p:nvPr>
+            <p:ph type="ftr" sz="quarter" idx="11"/>
+          </p:nvPr>
+        </p:nvSpPr>
+        <p:spPr/>
+        <p:txBody>
+          <a:bodyPr/>
+          <a:lstStyle/>
+          <a:p>
+            <a:r>
+              <a:rPr lang="fi-FI" dirty="0" err="1"/>
+              <a:t>Finnish</a:t>
+            </a:r>
+            <a:r>
+              <a:rPr lang="fi-FI" dirty="0"/>
+              <a:t> </a:t>
+            </a:r>
+            <a:r>
+              <a:rPr lang="fi-FI" dirty="0" err="1"/>
+              <a:t>Meteorological</a:t>
+            </a:r>
+            <a:r>
+              <a:rPr lang="fi-FI" dirty="0"/>
+              <a:t> Institute</a:t>
+            </a:r>
+          </a:p>
+        </p:txBody>
+      </p:sp>
       <p:pic>
         <p:nvPicPr>
-          <p:cNvPr id="9" name="Content Placeholder 8">
+          <p:cNvPr id="8" name="Picture 7">
             <a:extLst>
               <a:ext uri="{FF2B5EF4-FFF2-40B4-BE49-F238E27FC236}">
-                <a16:creationId xmlns:a16="http://schemas.microsoft.com/office/drawing/2014/main" id="{AA3F6DD2-F334-DD47-8B33-10BE68BE6234}"/>
+                <a16:creationId xmlns:a16="http://schemas.microsoft.com/office/drawing/2014/main" id="{107F68DC-E84E-194F-A911-449F9214EB73}"/>
               </a:ext>
             </a:extLst>
           </p:cNvPr>
           <p:cNvPicPr>
-            <a:picLocks noGrp="1" noChangeAspect="1"/>
+            <a:picLocks noChangeAspect="1"/>
           </p:cNvPicPr>
-          <p:nvPr>
-            <p:ph idx="1"/>
-          </p:nvPr>
+          <p:nvPr/>
         </p:nvPicPr>
-        <p:blipFill rotWithShape="1">
+        <p:blipFill>
           <a:blip r:embed="rId3">
             <a:extLst>
               <a:ext uri="{28A0092B-C50C-407E-A947-70E740481C1C}">
@@ -12946,95 +13679,24 @@
               </a:ext>
             </a:extLst>
           </a:blip>
-          <a:srcRect l="7422" b="16529"/>
-          <a:stretch/>
+          <a:stretch>
+            <a:fillRect/>
+          </a:stretch>
         </p:blipFill>
         <p:spPr>
           <a:xfrm>
-            <a:off x="304800" y="1074058"/>
-            <a:ext cx="9594850" cy="5282294"/>
+            <a:off x="642501" y="1796829"/>
+            <a:ext cx="7967601" cy="3930871"/>
           </a:xfrm>
+          <a:prstGeom prst="rect">
+            <a:avLst/>
+          </a:prstGeom>
         </p:spPr>
       </p:pic>
-      <p:sp>
-        <p:nvSpPr>
-          <p:cNvPr id="2" name="Title 1"/>
-          <p:cNvSpPr>
-            <a:spLocks noGrp="1"/>
-          </p:cNvSpPr>
-          <p:nvPr>
-            <p:ph type="title"/>
-          </p:nvPr>
-        </p:nvSpPr>
-        <p:spPr/>
-        <p:txBody>
-          <a:bodyPr/>
-          <a:lstStyle/>
-          <a:p>
-            <a:r>
-              <a:rPr lang="en-US" b="1" dirty="0">
-                <a:latin typeface="Avenir Black" charset="0"/>
-                <a:ea typeface="Avenir Black" charset="0"/>
-                <a:cs typeface="Avenir Black" charset="0"/>
-              </a:rPr>
-              <a:t>Label Data</a:t>
-            </a:r>
-            <a:br>
-              <a:rPr lang="en-US" b="1" dirty="0">
-                <a:latin typeface="Avenir Black" charset="0"/>
-                <a:ea typeface="Avenir Black" charset="0"/>
-                <a:cs typeface="Avenir Black" charset="0"/>
-              </a:rPr>
-            </a:br>
-            <a:r>
-              <a:rPr lang="en-US" sz="2000" b="1" dirty="0">
-                <a:latin typeface="Avenir Black" charset="0"/>
-                <a:ea typeface="Avenir Black" charset="0"/>
-                <a:cs typeface="Avenir Black" charset="0"/>
-              </a:rPr>
-              <a:t>Mean delay between stations, passenger trains</a:t>
-            </a:r>
-          </a:p>
-        </p:txBody>
-      </p:sp>
-      <p:sp>
-        <p:nvSpPr>
-          <p:cNvPr id="5" name="Footer Placeholder 4"/>
-          <p:cNvSpPr>
-            <a:spLocks noGrp="1"/>
-          </p:cNvSpPr>
-          <p:nvPr>
-            <p:ph type="ftr" sz="quarter" idx="11"/>
-          </p:nvPr>
-        </p:nvSpPr>
-        <p:spPr/>
-        <p:txBody>
-          <a:bodyPr/>
-          <a:lstStyle/>
-          <a:p>
-            <a:r>
-              <a:rPr lang="fi-FI" dirty="0" err="1"/>
-              <a:t>Finnish</a:t>
-            </a:r>
-            <a:r>
-              <a:rPr lang="fi-FI" dirty="0"/>
-              <a:t> </a:t>
-            </a:r>
-            <a:r>
-              <a:rPr lang="fi-FI" dirty="0" err="1"/>
-              <a:t>Meteorological</a:t>
-            </a:r>
-            <a:r>
-              <a:rPr lang="fi-FI" dirty="0"/>
-              <a:t> Institute</a:t>
-            </a:r>
-          </a:p>
-        </p:txBody>
-      </p:sp>
     </p:spTree>
     <p:extLst>
       <p:ext uri="{BB962C8B-B14F-4D97-AF65-F5344CB8AC3E}">
-        <p14:creationId xmlns:p14="http://schemas.microsoft.com/office/powerpoint/2010/main" val="947139750"/>
+        <p14:creationId xmlns:p14="http://schemas.microsoft.com/office/powerpoint/2010/main" val="3891380015"/>
       </p:ext>
     </p:extLst>
   </p:cSld>
@@ -13085,6 +13747,145 @@
               </a:ext>
             </a:extLst>
           </a:blip>
+          <a:srcRect l="7422" b="16529"/>
+          <a:stretch/>
+        </p:blipFill>
+        <p:spPr>
+          <a:xfrm>
+            <a:off x="304800" y="1074058"/>
+            <a:ext cx="9594850" cy="5282294"/>
+          </a:xfrm>
+        </p:spPr>
+      </p:pic>
+      <p:sp>
+        <p:nvSpPr>
+          <p:cNvPr id="2" name="Title 1"/>
+          <p:cNvSpPr>
+            <a:spLocks noGrp="1"/>
+          </p:cNvSpPr>
+          <p:nvPr>
+            <p:ph type="title"/>
+          </p:nvPr>
+        </p:nvSpPr>
+        <p:spPr/>
+        <p:txBody>
+          <a:bodyPr/>
+          <a:lstStyle/>
+          <a:p>
+            <a:r>
+              <a:rPr lang="en-US" b="1" dirty="0">
+                <a:latin typeface="Avenir Black" charset="0"/>
+                <a:ea typeface="Avenir Black" charset="0"/>
+                <a:cs typeface="Avenir Black" charset="0"/>
+              </a:rPr>
+              <a:t>Label Data</a:t>
+            </a:r>
+            <a:br>
+              <a:rPr lang="en-US" b="1" dirty="0">
+                <a:latin typeface="Avenir Black" charset="0"/>
+                <a:ea typeface="Avenir Black" charset="0"/>
+                <a:cs typeface="Avenir Black" charset="0"/>
+              </a:rPr>
+            </a:br>
+            <a:r>
+              <a:rPr lang="en-US" sz="2000" b="1" dirty="0">
+                <a:latin typeface="Avenir Black" charset="0"/>
+                <a:ea typeface="Avenir Black" charset="0"/>
+                <a:cs typeface="Avenir Black" charset="0"/>
+              </a:rPr>
+              <a:t>Mean delay between stations, passenger trains</a:t>
+            </a:r>
+          </a:p>
+        </p:txBody>
+      </p:sp>
+      <p:sp>
+        <p:nvSpPr>
+          <p:cNvPr id="5" name="Footer Placeholder 4"/>
+          <p:cNvSpPr>
+            <a:spLocks noGrp="1"/>
+          </p:cNvSpPr>
+          <p:nvPr>
+            <p:ph type="ftr" sz="quarter" idx="11"/>
+          </p:nvPr>
+        </p:nvSpPr>
+        <p:spPr/>
+        <p:txBody>
+          <a:bodyPr/>
+          <a:lstStyle/>
+          <a:p>
+            <a:r>
+              <a:rPr lang="fi-FI" dirty="0" err="1"/>
+              <a:t>Finnish</a:t>
+            </a:r>
+            <a:r>
+              <a:rPr lang="fi-FI" dirty="0"/>
+              <a:t> </a:t>
+            </a:r>
+            <a:r>
+              <a:rPr lang="fi-FI" dirty="0" err="1"/>
+              <a:t>Meteorological</a:t>
+            </a:r>
+            <a:r>
+              <a:rPr lang="fi-FI" dirty="0"/>
+              <a:t> Institute</a:t>
+            </a:r>
+          </a:p>
+        </p:txBody>
+      </p:sp>
+    </p:spTree>
+    <p:extLst>
+      <p:ext uri="{BB962C8B-B14F-4D97-AF65-F5344CB8AC3E}">
+        <p14:creationId xmlns:p14="http://schemas.microsoft.com/office/powerpoint/2010/main" val="947139750"/>
+      </p:ext>
+    </p:extLst>
+  </p:cSld>
+  <p:clrMapOvr>
+    <a:masterClrMapping/>
+  </p:clrMapOvr>
+</p:sld>
+</file>
+
+<file path=ppt/slides/slide6.xml><?xml version="1.0" encoding="utf-8"?>
+<p:sld xmlns:a="http://schemas.openxmlformats.org/drawingml/2006/main" xmlns:r="http://schemas.openxmlformats.org/officeDocument/2006/relationships" xmlns:p="http://schemas.openxmlformats.org/presentationml/2006/main">
+  <p:cSld>
+    <p:spTree>
+      <p:nvGrpSpPr>
+        <p:cNvPr id="1" name=""/>
+        <p:cNvGrpSpPr/>
+        <p:nvPr/>
+      </p:nvGrpSpPr>
+      <p:grpSpPr>
+        <a:xfrm>
+          <a:off x="0" y="0"/>
+          <a:ext cx="0" cy="0"/>
+          <a:chOff x="0" y="0"/>
+          <a:chExt cx="0" cy="0"/>
+        </a:xfrm>
+      </p:grpSpPr>
+      <p:pic>
+        <p:nvPicPr>
+          <p:cNvPr id="9" name="Content Placeholder 8">
+            <a:extLst>
+              <a:ext uri="{FF2B5EF4-FFF2-40B4-BE49-F238E27FC236}">
+                <a16:creationId xmlns:a16="http://schemas.microsoft.com/office/drawing/2014/main" id="{AA3F6DD2-F334-DD47-8B33-10BE68BE6234}"/>
+              </a:ext>
+            </a:extLst>
+          </p:cNvPr>
+          <p:cNvPicPr>
+            <a:picLocks noGrp="1" noChangeAspect="1"/>
+          </p:cNvPicPr>
+          <p:nvPr>
+            <p:ph idx="1"/>
+          </p:nvPr>
+        </p:nvPicPr>
+        <p:blipFill rotWithShape="1">
+          <a:blip r:embed="rId3">
+            <a:extLst>
+              <a:ext uri="{28A0092B-C50C-407E-A947-70E740481C1C}">
+                <a14:useLocalDpi xmlns:a14="http://schemas.microsoft.com/office/drawing/2010/main" val="0"/>
+              </a:ext>
+            </a:extLst>
+          </a:blip>
           <a:srcRect l="4075"/>
           <a:stretch/>
         </p:blipFill>
@@ -13183,7 +13984,7 @@
 </p:sld>
 </file>
 
-<file path=ppt/slides/slide6.xml><?xml version="1.0" encoding="utf-8"?>
+<file path=ppt/slides/slide7.xml><?xml version="1.0" encoding="utf-8"?>
 <p:sld xmlns:a="http://schemas.openxmlformats.org/drawingml/2006/main" xmlns:r="http://schemas.openxmlformats.org/officeDocument/2006/relationships" xmlns:p="http://schemas.openxmlformats.org/presentationml/2006/main">
   <p:cSld>
     <p:spTree>
@@ -13323,7 +14124,7 @@
 </p:sld>
 </file>
 
-<file path=ppt/slides/slide7.xml><?xml version="1.0" encoding="utf-8"?>
+<file path=ppt/slides/slide8.xml><?xml version="1.0" encoding="utf-8"?>
 <p:sld xmlns:a="http://schemas.openxmlformats.org/drawingml/2006/main" xmlns:r="http://schemas.openxmlformats.org/officeDocument/2006/relationships" xmlns:p="http://schemas.openxmlformats.org/presentationml/2006/main">
   <p:cSld>
     <p:spTree>
@@ -13462,7 +14263,7 @@
 </p:sld>
 </file>
 
-<file path=ppt/slides/slide8.xml><?xml version="1.0" encoding="utf-8"?>
+<file path=ppt/slides/slide9.xml><?xml version="1.0" encoding="utf-8"?>
 <p:sld xmlns:a="http://schemas.openxmlformats.org/drawingml/2006/main" xmlns:r="http://schemas.openxmlformats.org/officeDocument/2006/relationships" xmlns:p="http://schemas.openxmlformats.org/presentationml/2006/main">
   <p:cSld>
     <p:spTree>
@@ -13529,7 +14330,7 @@
           <a:lstStyle/>
           <a:p>
             <a:r>
-              <a:rPr lang="en-US" b="1">
+              <a:rPr lang="en-US" b="1" dirty="0">
                 <a:latin typeface="Avenir Black" charset="0"/>
                 <a:ea typeface="Avenir Black" charset="0"/>
                 <a:cs typeface="Avenir Black" charset="0"/>
@@ -13592,436 +14393,6 @@
     <p:extLst>
       <p:ext uri="{BB962C8B-B14F-4D97-AF65-F5344CB8AC3E}">
         <p14:creationId xmlns:p14="http://schemas.microsoft.com/office/powerpoint/2010/main" val="778420745"/>
-      </p:ext>
-    </p:extLst>
-  </p:cSld>
-  <p:clrMapOvr>
-    <a:masterClrMapping/>
-  </p:clrMapOvr>
-</p:sld>
-</file>
-
-<file path=ppt/slides/slide9.xml><?xml version="1.0" encoding="utf-8"?>
-<p:sld xmlns:a="http://schemas.openxmlformats.org/drawingml/2006/main" xmlns:r="http://schemas.openxmlformats.org/officeDocument/2006/relationships" xmlns:p="http://schemas.openxmlformats.org/presentationml/2006/main">
-  <p:cSld>
-    <p:spTree>
-      <p:nvGrpSpPr>
-        <p:cNvPr id="1" name=""/>
-        <p:cNvGrpSpPr/>
-        <p:nvPr/>
-      </p:nvGrpSpPr>
-      <p:grpSpPr>
-        <a:xfrm>
-          <a:off x="0" y="0"/>
-          <a:ext cx="0" cy="0"/>
-          <a:chOff x="0" y="0"/>
-          <a:chExt cx="0" cy="0"/>
-        </a:xfrm>
-      </p:grpSpPr>
-      <p:sp>
-        <p:nvSpPr>
-          <p:cNvPr id="2" name="Title 1"/>
-          <p:cNvSpPr>
-            <a:spLocks noGrp="1"/>
-          </p:cNvSpPr>
-          <p:nvPr>
-            <p:ph type="title"/>
-          </p:nvPr>
-        </p:nvSpPr>
-        <p:spPr/>
-        <p:txBody>
-          <a:bodyPr/>
-          <a:lstStyle/>
-          <a:p>
-            <a:r>
-              <a:rPr lang="en-US" b="1" dirty="0">
-                <a:latin typeface="Avenir Black" charset="0"/>
-                <a:ea typeface="Avenir Black" charset="0"/>
-                <a:cs typeface="Avenir Black" charset="0"/>
-              </a:rPr>
-              <a:t>Feature Data</a:t>
-            </a:r>
-          </a:p>
-        </p:txBody>
-      </p:sp>
-      <p:sp>
-        <p:nvSpPr>
-          <p:cNvPr id="3" name="Content Placeholder 2"/>
-          <p:cNvSpPr>
-            <a:spLocks noGrp="1"/>
-          </p:cNvSpPr>
-          <p:nvPr>
-            <p:ph idx="1"/>
-          </p:nvPr>
-        </p:nvSpPr>
-        <p:spPr>
-          <a:xfrm>
-            <a:off x="642501" y="1663403"/>
-            <a:ext cx="8599095" cy="4242814"/>
-          </a:xfrm>
-        </p:spPr>
-        <p:txBody>
-          <a:bodyPr>
-            <a:normAutofit/>
-          </a:bodyPr>
-          <a:lstStyle/>
-          <a:p>
-            <a:pPr marL="198000" indent="-198000">
-              <a:lnSpc>
-                <a:spcPct val="130000"/>
-              </a:lnSpc>
-            </a:pPr>
-            <a:r>
-              <a:rPr lang="en-US" dirty="0">
-                <a:solidFill>
-                  <a:schemeClr val="bg2">
-                    <a:lumMod val="50000"/>
-                  </a:schemeClr>
-                </a:solidFill>
-                <a:latin typeface="Avenir Book" charset="0"/>
-                <a:ea typeface="Avenir Book" charset="0"/>
-                <a:cs typeface="Avenir Book" charset="0"/>
-              </a:rPr>
-              <a:t>Features for training: </a:t>
-            </a:r>
-          </a:p>
-          <a:p>
-            <a:pPr marL="883800" lvl="1" indent="-198000">
-              <a:lnSpc>
-                <a:spcPct val="130000"/>
-              </a:lnSpc>
-            </a:pPr>
-            <a:r>
-              <a:rPr lang="en-US" dirty="0">
-                <a:solidFill>
-                  <a:schemeClr val="bg2">
-                    <a:lumMod val="50000"/>
-                  </a:schemeClr>
-                </a:solidFill>
-                <a:latin typeface="Avenir Book" charset="0"/>
-                <a:ea typeface="Avenir Book" charset="0"/>
-                <a:cs typeface="Avenir Book" charset="0"/>
-              </a:rPr>
-              <a:t>19 weather observation parameters near train stations</a:t>
-            </a:r>
-          </a:p>
-          <a:p>
-            <a:pPr marL="198000" indent="-198000">
-              <a:lnSpc>
-                <a:spcPct val="130000"/>
-              </a:lnSpc>
-            </a:pPr>
-            <a:r>
-              <a:rPr lang="en-US" dirty="0">
-                <a:solidFill>
-                  <a:schemeClr val="bg2">
-                    <a:lumMod val="50000"/>
-                  </a:schemeClr>
-                </a:solidFill>
-                <a:latin typeface="Avenir Book" charset="0"/>
-                <a:ea typeface="Avenir Book" charset="0"/>
-                <a:cs typeface="Avenir Book" charset="0"/>
-              </a:rPr>
-              <a:t>Four train types (intercity, commuter, cargo, other)</a:t>
-            </a:r>
-          </a:p>
-          <a:p>
-            <a:pPr marL="883800" lvl="1" indent="-198000">
-              <a:lnSpc>
-                <a:spcPct val="130000"/>
-              </a:lnSpc>
-            </a:pPr>
-            <a:r>
-              <a:rPr lang="en-US" dirty="0">
-                <a:solidFill>
-                  <a:schemeClr val="bg2">
-                    <a:lumMod val="50000"/>
-                  </a:schemeClr>
-                </a:solidFill>
-                <a:latin typeface="Avenir Book" charset="0"/>
-                <a:ea typeface="Avenir Book" charset="0"/>
-                <a:cs typeface="Avenir Book" charset="0"/>
-              </a:rPr>
-              <a:t>We consider only passenger trains</a:t>
-            </a:r>
-          </a:p>
-          <a:p>
-            <a:pPr marL="198000" indent="-198000">
-              <a:lnSpc>
-                <a:spcPct val="130000"/>
-              </a:lnSpc>
-            </a:pPr>
-            <a:r>
-              <a:rPr lang="en-US" dirty="0">
-                <a:solidFill>
-                  <a:schemeClr val="bg2">
-                    <a:lumMod val="50000"/>
-                  </a:schemeClr>
-                </a:solidFill>
-                <a:latin typeface="Avenir Book" charset="0"/>
-                <a:ea typeface="Avenir Book" charset="0"/>
-                <a:cs typeface="Avenir Book" charset="0"/>
-              </a:rPr>
-              <a:t>Training with data from 2010 to 2018</a:t>
-            </a:r>
-          </a:p>
-          <a:p>
-            <a:pPr marL="883800" lvl="1" indent="-198000">
-              <a:lnSpc>
-                <a:spcPct val="130000"/>
-              </a:lnSpc>
-            </a:pPr>
-            <a:r>
-              <a:rPr lang="fi-FI" dirty="0">
-                <a:solidFill>
-                  <a:schemeClr val="bg2">
-                    <a:lumMod val="50000"/>
-                  </a:schemeClr>
-                </a:solidFill>
-                <a:latin typeface="Avenir Book" charset="0"/>
-                <a:ea typeface="Avenir Book" charset="0"/>
-                <a:cs typeface="Avenir Book" charset="0"/>
-              </a:rPr>
-              <a:t>Dataset </a:t>
-            </a:r>
-            <a:r>
-              <a:rPr lang="fi-FI" dirty="0" err="1">
-                <a:solidFill>
-                  <a:schemeClr val="bg2">
-                    <a:lumMod val="50000"/>
-                  </a:schemeClr>
-                </a:solidFill>
-                <a:latin typeface="Avenir Book" charset="0"/>
-                <a:ea typeface="Avenir Book" charset="0"/>
-                <a:cs typeface="Avenir Book" charset="0"/>
-              </a:rPr>
-              <a:t>size</a:t>
-            </a:r>
-            <a:r>
-              <a:rPr lang="fi-FI" dirty="0">
-                <a:solidFill>
-                  <a:schemeClr val="bg2">
-                    <a:lumMod val="50000"/>
-                  </a:schemeClr>
-                </a:solidFill>
-                <a:latin typeface="Avenir Book" charset="0"/>
-                <a:ea typeface="Avenir Book" charset="0"/>
-                <a:cs typeface="Avenir Book" charset="0"/>
-              </a:rPr>
-              <a:t> 27 132 093 </a:t>
-            </a:r>
-            <a:r>
-              <a:rPr lang="fi-FI" dirty="0" err="1">
-                <a:solidFill>
-                  <a:schemeClr val="bg2">
-                    <a:lumMod val="50000"/>
-                  </a:schemeClr>
-                </a:solidFill>
-                <a:latin typeface="Avenir Book" charset="0"/>
-                <a:ea typeface="Avenir Book" charset="0"/>
-                <a:cs typeface="Avenir Book" charset="0"/>
-              </a:rPr>
-              <a:t>rows</a:t>
-            </a:r>
-            <a:endParaRPr lang="en-US" dirty="0">
-              <a:solidFill>
-                <a:schemeClr val="bg2">
-                  <a:lumMod val="50000"/>
-                </a:schemeClr>
-              </a:solidFill>
-              <a:latin typeface="Avenir Book" charset="0"/>
-              <a:ea typeface="Avenir Book" charset="0"/>
-              <a:cs typeface="Avenir Book" charset="0"/>
-            </a:endParaRPr>
-          </a:p>
-          <a:p>
-            <a:pPr marL="198000" indent="-198000">
-              <a:lnSpc>
-                <a:spcPct val="130000"/>
-              </a:lnSpc>
-            </a:pPr>
-            <a:r>
-              <a:rPr lang="en-US" dirty="0">
-                <a:solidFill>
-                  <a:schemeClr val="bg2">
-                    <a:lumMod val="50000"/>
-                  </a:schemeClr>
-                </a:solidFill>
-                <a:latin typeface="Avenir Book" charset="0"/>
-                <a:ea typeface="Avenir Book" charset="0"/>
-                <a:cs typeface="Avenir Book" charset="0"/>
-              </a:rPr>
-              <a:t>Features for prediction</a:t>
-            </a:r>
-          </a:p>
-          <a:p>
-            <a:pPr marL="883800" lvl="1" indent="-198000">
-              <a:lnSpc>
-                <a:spcPct val="130000"/>
-              </a:lnSpc>
-            </a:pPr>
-            <a:r>
-              <a:rPr lang="en-US" dirty="0">
-                <a:solidFill>
-                  <a:schemeClr val="bg2">
-                    <a:lumMod val="50000"/>
-                  </a:schemeClr>
-                </a:solidFill>
-                <a:latin typeface="Avenir Book" charset="0"/>
-                <a:ea typeface="Avenir Book" charset="0"/>
-                <a:cs typeface="Avenir Book" charset="0"/>
-              </a:rPr>
-              <a:t>The same weather parameters as in training fetched from Harmonie numerical weather prediction model</a:t>
-            </a:r>
-          </a:p>
-          <a:p>
-            <a:pPr>
-              <a:lnSpc>
-                <a:spcPct val="110000"/>
-              </a:lnSpc>
-              <a:buNone/>
-            </a:pPr>
-            <a:endParaRPr lang="en-US" dirty="0">
-              <a:solidFill>
-                <a:schemeClr val="bg2">
-                  <a:lumMod val="50000"/>
-                </a:schemeClr>
-              </a:solidFill>
-              <a:latin typeface="Avenir Book" charset="0"/>
-              <a:ea typeface="Avenir Book" charset="0"/>
-              <a:cs typeface="Avenir Book" charset="0"/>
-            </a:endParaRPr>
-          </a:p>
-          <a:p>
-            <a:pPr>
-              <a:lnSpc>
-                <a:spcPct val="110000"/>
-              </a:lnSpc>
-              <a:buNone/>
-            </a:pPr>
-            <a:endParaRPr lang="en-US" dirty="0">
-              <a:solidFill>
-                <a:schemeClr val="bg2">
-                  <a:lumMod val="50000"/>
-                </a:schemeClr>
-              </a:solidFill>
-              <a:latin typeface="Avenir Book" charset="0"/>
-              <a:ea typeface="Avenir Book" charset="0"/>
-              <a:cs typeface="Avenir Book" charset="0"/>
-            </a:endParaRPr>
-          </a:p>
-          <a:p>
-            <a:pPr marL="198000" indent="-198000">
-              <a:lnSpc>
-                <a:spcPct val="110000"/>
-              </a:lnSpc>
-            </a:pPr>
-            <a:endParaRPr lang="en-US" dirty="0">
-              <a:solidFill>
-                <a:schemeClr val="bg2">
-                  <a:lumMod val="50000"/>
-                </a:schemeClr>
-              </a:solidFill>
-              <a:latin typeface="Avenir Book" charset="0"/>
-              <a:ea typeface="Avenir Book" charset="0"/>
-              <a:cs typeface="Avenir Book" charset="0"/>
-            </a:endParaRPr>
-          </a:p>
-          <a:p>
-            <a:pPr marL="198000" indent="-198000">
-              <a:lnSpc>
-                <a:spcPct val="110000"/>
-              </a:lnSpc>
-            </a:pPr>
-            <a:endParaRPr lang="en-US" dirty="0">
-              <a:solidFill>
-                <a:schemeClr val="bg2">
-                  <a:lumMod val="50000"/>
-                </a:schemeClr>
-              </a:solidFill>
-              <a:latin typeface="Avenir Book" charset="0"/>
-              <a:ea typeface="Avenir Book" charset="0"/>
-              <a:cs typeface="Avenir Book" charset="0"/>
-            </a:endParaRPr>
-          </a:p>
-          <a:p>
-            <a:pPr marL="198000" indent="-198000"/>
-            <a:endParaRPr lang="en-US" dirty="0">
-              <a:latin typeface="Avenir Book" charset="0"/>
-              <a:ea typeface="Avenir Book" charset="0"/>
-              <a:cs typeface="Avenir Book" charset="0"/>
-            </a:endParaRPr>
-          </a:p>
-        </p:txBody>
-      </p:sp>
-      <p:sp>
-        <p:nvSpPr>
-          <p:cNvPr id="5" name="Footer Placeholder 4"/>
-          <p:cNvSpPr>
-            <a:spLocks noGrp="1"/>
-          </p:cNvSpPr>
-          <p:nvPr>
-            <p:ph type="ftr" sz="quarter" idx="11"/>
-          </p:nvPr>
-        </p:nvSpPr>
-        <p:spPr/>
-        <p:txBody>
-          <a:bodyPr/>
-          <a:lstStyle/>
-          <a:p>
-            <a:r>
-              <a:rPr lang="fi-FI" dirty="0" err="1"/>
-              <a:t>Finnish</a:t>
-            </a:r>
-            <a:r>
-              <a:rPr lang="fi-FI" dirty="0"/>
-              <a:t> </a:t>
-            </a:r>
-            <a:r>
-              <a:rPr lang="fi-FI" dirty="0" err="1"/>
-              <a:t>Meteorological</a:t>
-            </a:r>
-            <a:r>
-              <a:rPr lang="fi-FI" dirty="0"/>
-              <a:t> Institute</a:t>
-            </a:r>
-          </a:p>
-        </p:txBody>
-      </p:sp>
-      <p:pic>
-        <p:nvPicPr>
-          <p:cNvPr id="4" name="Picture 3"/>
-          <p:cNvPicPr>
-            <a:picLocks noChangeAspect="1"/>
-          </p:cNvPicPr>
-          <p:nvPr/>
-        </p:nvPicPr>
-        <p:blipFill>
-          <a:blip r:embed="rId3">
-            <a:extLst>
-              <a:ext uri="{28A0092B-C50C-407E-A947-70E740481C1C}">
-                <a14:useLocalDpi xmlns:a14="http://schemas.microsoft.com/office/drawing/2010/main" val="0"/>
-              </a:ext>
-            </a:extLst>
-          </a:blip>
-          <a:stretch>
-            <a:fillRect/>
-          </a:stretch>
-        </p:blipFill>
-        <p:spPr>
-          <a:xfrm>
-            <a:off x="7101279" y="0"/>
-            <a:ext cx="1471783" cy="2185817"/>
-          </a:xfrm>
-          <a:prstGeom prst="rect">
-            <a:avLst/>
-          </a:prstGeom>
-        </p:spPr>
-      </p:pic>
-    </p:spTree>
-    <p:extLst>
-      <p:ext uri="{BB962C8B-B14F-4D97-AF65-F5344CB8AC3E}">
-        <p14:creationId xmlns:p14="http://schemas.microsoft.com/office/powerpoint/2010/main" val="1779453108"/>
       </p:ext>
     </p:extLst>
   </p:cSld>

</xml_diff>